<commit_message>
Update documentation and PPP
</commit_message>
<xml_diff>
--- a/docs/diagrams/LoginCommandSequenceDiagram.pptx
+++ b/docs/diagrams/LoginCommandSequenceDiagram.pptx
@@ -208,7 +208,7 @@
           <a:p>
             <a:fld id="{F5CC4B3F-88C1-4FFA-B1B6-F41C21DC6924}" type="datetimeFigureOut">
               <a:rPr lang="en-US" smtClean="0"/>
-              <a:t>10/24/2018</a:t>
+              <a:t>11/12/2018</a:t>
             </a:fld>
             <a:endParaRPr lang="en-US"/>
           </a:p>
@@ -654,7 +654,7 @@
           <a:p>
             <a:fld id="{78C97017-6FC3-485B-9764-EAC9E56C1D49}" type="datetimeFigureOut">
               <a:rPr lang="en-US" smtClean="0"/>
-              <a:t>10/24/2018</a:t>
+              <a:t>11/12/2018</a:t>
             </a:fld>
             <a:endParaRPr lang="en-US"/>
           </a:p>
@@ -822,7 +822,7 @@
           <a:p>
             <a:fld id="{78C97017-6FC3-485B-9764-EAC9E56C1D49}" type="datetimeFigureOut">
               <a:rPr lang="en-US" smtClean="0"/>
-              <a:t>10/24/2018</a:t>
+              <a:t>11/12/2018</a:t>
             </a:fld>
             <a:endParaRPr lang="en-US"/>
           </a:p>
@@ -1000,7 +1000,7 @@
           <a:p>
             <a:fld id="{78C97017-6FC3-485B-9764-EAC9E56C1D49}" type="datetimeFigureOut">
               <a:rPr lang="en-US" smtClean="0"/>
-              <a:t>10/24/2018</a:t>
+              <a:t>11/12/2018</a:t>
             </a:fld>
             <a:endParaRPr lang="en-US"/>
           </a:p>
@@ -1168,7 +1168,7 @@
           <a:p>
             <a:fld id="{78C97017-6FC3-485B-9764-EAC9E56C1D49}" type="datetimeFigureOut">
               <a:rPr lang="en-US" smtClean="0"/>
-              <a:t>10/24/2018</a:t>
+              <a:t>11/12/2018</a:t>
             </a:fld>
             <a:endParaRPr lang="en-US"/>
           </a:p>
@@ -1413,7 +1413,7 @@
           <a:p>
             <a:fld id="{78C97017-6FC3-485B-9764-EAC9E56C1D49}" type="datetimeFigureOut">
               <a:rPr lang="en-US" smtClean="0"/>
-              <a:t>10/24/2018</a:t>
+              <a:t>11/12/2018</a:t>
             </a:fld>
             <a:endParaRPr lang="en-US"/>
           </a:p>
@@ -1698,7 +1698,7 @@
           <a:p>
             <a:fld id="{78C97017-6FC3-485B-9764-EAC9E56C1D49}" type="datetimeFigureOut">
               <a:rPr lang="en-US" smtClean="0"/>
-              <a:t>10/24/2018</a:t>
+              <a:t>11/12/2018</a:t>
             </a:fld>
             <a:endParaRPr lang="en-US"/>
           </a:p>
@@ -2117,7 +2117,7 @@
           <a:p>
             <a:fld id="{78C97017-6FC3-485B-9764-EAC9E56C1D49}" type="datetimeFigureOut">
               <a:rPr lang="en-US" smtClean="0"/>
-              <a:t>10/24/2018</a:t>
+              <a:t>11/12/2018</a:t>
             </a:fld>
             <a:endParaRPr lang="en-US"/>
           </a:p>
@@ -2234,7 +2234,7 @@
           <a:p>
             <a:fld id="{78C97017-6FC3-485B-9764-EAC9E56C1D49}" type="datetimeFigureOut">
               <a:rPr lang="en-US" smtClean="0"/>
-              <a:t>10/24/2018</a:t>
+              <a:t>11/12/2018</a:t>
             </a:fld>
             <a:endParaRPr lang="en-US"/>
           </a:p>
@@ -2329,7 +2329,7 @@
           <a:p>
             <a:fld id="{78C97017-6FC3-485B-9764-EAC9E56C1D49}" type="datetimeFigureOut">
               <a:rPr lang="en-US" smtClean="0"/>
-              <a:t>10/24/2018</a:t>
+              <a:t>11/12/2018</a:t>
             </a:fld>
             <a:endParaRPr lang="en-US"/>
           </a:p>
@@ -2604,7 +2604,7 @@
           <a:p>
             <a:fld id="{78C97017-6FC3-485B-9764-EAC9E56C1D49}" type="datetimeFigureOut">
               <a:rPr lang="en-US" smtClean="0"/>
-              <a:t>10/24/2018</a:t>
+              <a:t>11/12/2018</a:t>
             </a:fld>
             <a:endParaRPr lang="en-US"/>
           </a:p>
@@ -2856,7 +2856,7 @@
           <a:p>
             <a:fld id="{78C97017-6FC3-485B-9764-EAC9E56C1D49}" type="datetimeFigureOut">
               <a:rPr lang="en-US" smtClean="0"/>
-              <a:t>10/24/2018</a:t>
+              <a:t>11/12/2018</a:t>
             </a:fld>
             <a:endParaRPr lang="en-US"/>
           </a:p>
@@ -3067,7 +3067,7 @@
           <a:p>
             <a:fld id="{78C97017-6FC3-485B-9764-EAC9E56C1D49}" type="datetimeFigureOut">
               <a:rPr lang="en-US" smtClean="0"/>
-              <a:t>10/24/2018</a:t>
+              <a:t>11/12/2018</a:t>
             </a:fld>
             <a:endParaRPr lang="en-US"/>
           </a:p>
@@ -3450,8 +3450,8 @@
         </p:nvSpPr>
         <p:spPr>
           <a:xfrm>
-            <a:off x="371777" y="426365"/>
-            <a:ext cx="7915275" cy="8467527"/>
+            <a:off x="429568" y="474212"/>
+            <a:ext cx="10143823" cy="7803234"/>
           </a:xfrm>
           <a:prstGeom prst="roundRect">
             <a:avLst>
@@ -3581,7 +3581,7 @@
         <p:spPr>
           <a:xfrm>
             <a:off x="1191859" y="1136219"/>
-            <a:ext cx="0" cy="7757673"/>
+            <a:ext cx="0" cy="7093381"/>
           </a:xfrm>
           <a:prstGeom prst="line">
             <a:avLst/>
@@ -3617,8 +3617,8 @@
         </p:nvSpPr>
         <p:spPr>
           <a:xfrm>
-            <a:off x="1103888" y="1486912"/>
-            <a:ext cx="157487" cy="7276088"/>
+            <a:off x="1103888" y="1486911"/>
+            <a:ext cx="157487" cy="5886973"/>
           </a:xfrm>
           <a:prstGeom prst="rect">
             <a:avLst/>
@@ -3705,18 +3705,15 @@
                   <a:schemeClr val="bg1"/>
                 </a:solidFill>
               </a:rPr>
-              <a:t>:Address</a:t>
-            </a:r>
-          </a:p>
-          <a:p>
-            <a:pPr algn="ctr"/>
+              <a:t>:</a:t>
+            </a:r>
             <a:r>
               <a:rPr lang="en-US" sz="1600" dirty="0" err="1">
                 <a:solidFill>
                   <a:schemeClr val="bg1"/>
                 </a:solidFill>
               </a:rPr>
-              <a:t>BookParser</a:t>
+              <a:t>ExpenseTrackerParser</a:t>
             </a:r>
             <a:endParaRPr lang="en-SG" sz="1600" dirty="0">
               <a:solidFill>
@@ -3821,7 +3818,7 @@
         </p:nvSpPr>
         <p:spPr>
           <a:xfrm>
-            <a:off x="5896450" y="2840056"/>
+            <a:off x="8116794" y="3942898"/>
             <a:ext cx="1093635" cy="461538"/>
           </a:xfrm>
           <a:prstGeom prst="rect">
@@ -3897,9 +3894,9 @@
           <p:nvPr/>
         </p:nvCxnSpPr>
         <p:spPr>
-          <a:xfrm>
-            <a:off x="6404417" y="3297854"/>
-            <a:ext cx="3314" cy="5021102"/>
+          <a:xfrm flipH="1">
+            <a:off x="8615199" y="4400696"/>
+            <a:ext cx="9562" cy="3447904"/>
           </a:xfrm>
           <a:prstGeom prst="line">
             <a:avLst/>
@@ -3935,7 +3932,7 @@
         </p:nvSpPr>
         <p:spPr>
           <a:xfrm>
-            <a:off x="6323604" y="3297854"/>
+            <a:off x="8543948" y="4400696"/>
             <a:ext cx="161626" cy="212934"/>
           </a:xfrm>
           <a:prstGeom prst="rect">
@@ -4089,9 +4086,9 @@
           <p:nvPr/>
         </p:nvCxnSpPr>
         <p:spPr>
-          <a:xfrm flipV="1">
-            <a:off x="4787067" y="2819403"/>
-            <a:ext cx="1093033" cy="2153"/>
+          <a:xfrm>
+            <a:off x="4834442" y="3927843"/>
+            <a:ext cx="3312095" cy="0"/>
           </a:xfrm>
           <a:prstGeom prst="straightConnector1">
             <a:avLst/>
@@ -4126,7 +4123,7 @@
         </p:nvSpPr>
         <p:spPr>
           <a:xfrm>
-            <a:off x="3657602" y="4508956"/>
+            <a:off x="3446168" y="5328196"/>
             <a:ext cx="855809" cy="215444"/>
           </a:xfrm>
           <a:prstGeom prst="rect">
@@ -4161,13 +4158,15 @@
       <p:cxnSp>
         <p:nvCxnSpPr>
           <p:cNvPr id="34" name="Straight Arrow Connector 33"/>
-          <p:cNvCxnSpPr/>
+          <p:cNvCxnSpPr>
+            <a:cxnSpLocks/>
+          </p:cNvCxnSpPr>
           <p:nvPr/>
         </p:nvCxnSpPr>
         <p:spPr>
           <a:xfrm>
-            <a:off x="4830630" y="3524040"/>
-            <a:ext cx="1492974" cy="0"/>
+            <a:off x="4849154" y="4613630"/>
+            <a:ext cx="3703887" cy="0"/>
           </a:xfrm>
           <a:prstGeom prst="straightConnector1">
             <a:avLst/>
@@ -4242,7 +4241,7 @@
         </p:nvCxnSpPr>
         <p:spPr>
           <a:xfrm>
-            <a:off x="-69846" y="8763000"/>
+            <a:off x="-43992" y="7387508"/>
             <a:ext cx="1196051" cy="0"/>
           </a:xfrm>
           <a:prstGeom prst="straightConnector1">
@@ -4280,8 +4279,8 @@
         </p:nvSpPr>
         <p:spPr>
           <a:xfrm>
-            <a:off x="8356223" y="851829"/>
-            <a:ext cx="1030504" cy="346760"/>
+            <a:off x="10765436" y="1521782"/>
+            <a:ext cx="1526397" cy="346760"/>
           </a:xfrm>
           <a:prstGeom prst="rect">
             <a:avLst/>
@@ -4340,13 +4339,15 @@
       <p:cxnSp>
         <p:nvCxnSpPr>
           <p:cNvPr id="64" name="Straight Arrow Connector 63"/>
-          <p:cNvCxnSpPr/>
+          <p:cNvCxnSpPr>
+            <a:cxnSpLocks/>
+          </p:cNvCxnSpPr>
           <p:nvPr/>
         </p:nvCxnSpPr>
         <p:spPr>
           <a:xfrm>
-            <a:off x="1272253" y="4723917"/>
-            <a:ext cx="5043123" cy="0"/>
+            <a:off x="1271968" y="5211107"/>
+            <a:ext cx="7271227" cy="0"/>
           </a:xfrm>
           <a:prstGeom prst="straightConnector1">
             <a:avLst/>
@@ -4381,8 +4382,8 @@
         </p:nvSpPr>
         <p:spPr>
           <a:xfrm>
-            <a:off x="6322851" y="4723916"/>
-            <a:ext cx="156975" cy="3810016"/>
+            <a:off x="8543195" y="5211107"/>
+            <a:ext cx="156975" cy="2028657"/>
           </a:xfrm>
           <a:prstGeom prst="rect">
             <a:avLst/>
@@ -4416,7 +4417,7 @@
           <a:lstStyle/>
           <a:p>
             <a:pPr algn="ctr"/>
-            <a:endParaRPr lang="en-SG" sz="1400"/>
+            <a:endParaRPr lang="en-SG" sz="1400" dirty="0"/>
           </a:p>
         </p:txBody>
       </p:sp>
@@ -4430,8 +4431,8 @@
         </p:nvCxnSpPr>
         <p:spPr>
           <a:xfrm>
-            <a:off x="8871475" y="1190489"/>
-            <a:ext cx="0" cy="7703403"/>
+            <a:off x="11531052" y="1826582"/>
+            <a:ext cx="0" cy="6403523"/>
           </a:xfrm>
           <a:prstGeom prst="line">
             <a:avLst/>
@@ -4470,7 +4471,7 @@
         </p:nvSpPr>
         <p:spPr>
           <a:xfrm>
-            <a:off x="8797470" y="4738659"/>
+            <a:off x="11461758" y="5378833"/>
             <a:ext cx="143177" cy="885600"/>
           </a:xfrm>
           <a:prstGeom prst="rect">
@@ -4525,8 +4526,8 @@
         </p:nvCxnSpPr>
         <p:spPr>
           <a:xfrm flipV="1">
-            <a:off x="6469665" y="4739162"/>
-            <a:ext cx="2319299" cy="14037"/>
+            <a:off x="8688118" y="5378574"/>
+            <a:ext cx="2785905" cy="9590"/>
           </a:xfrm>
           <a:prstGeom prst="straightConnector1">
             <a:avLst/>
@@ -4553,89 +4554,6 @@
           </a:fontRef>
         </p:style>
       </p:cxnSp>
-      <p:cxnSp>
-        <p:nvCxnSpPr>
-          <p:cNvPr id="76" name="Straight Arrow Connector 75"/>
-          <p:cNvCxnSpPr>
-            <a:cxnSpLocks/>
-          </p:cNvCxnSpPr>
-          <p:nvPr/>
-        </p:nvCxnSpPr>
-        <p:spPr>
-          <a:xfrm>
-            <a:off x="6467774" y="4953000"/>
-            <a:ext cx="2316657" cy="0"/>
-          </a:xfrm>
-          <a:prstGeom prst="straightConnector1">
-            <a:avLst/>
-          </a:prstGeom>
-          <a:ln w="19050">
-            <a:solidFill>
-              <a:schemeClr val="accent4">
-                <a:lumMod val="60000"/>
-                <a:lumOff val="40000"/>
-              </a:schemeClr>
-            </a:solidFill>
-            <a:prstDash val="sysDash"/>
-            <a:headEnd type="arrow" w="med" len="med"/>
-            <a:tailEnd type="none" w="med" len="med"/>
-          </a:ln>
-        </p:spPr>
-        <p:style>
-          <a:lnRef idx="1">
-            <a:schemeClr val="accent1"/>
-          </a:lnRef>
-          <a:fillRef idx="0">
-            <a:schemeClr val="accent1"/>
-          </a:fillRef>
-          <a:effectRef idx="0">
-            <a:schemeClr val="accent1"/>
-          </a:effectRef>
-          <a:fontRef idx="minor">
-            <a:schemeClr val="tx1"/>
-          </a:fontRef>
-        </p:style>
-      </p:cxnSp>
-      <p:cxnSp>
-        <p:nvCxnSpPr>
-          <p:cNvPr id="77" name="Straight Arrow Connector 76"/>
-          <p:cNvCxnSpPr>
-            <a:cxnSpLocks/>
-          </p:cNvCxnSpPr>
-          <p:nvPr/>
-        </p:nvCxnSpPr>
-        <p:spPr>
-          <a:xfrm>
-            <a:off x="1261375" y="8537995"/>
-            <a:ext cx="5132449" cy="0"/>
-          </a:xfrm>
-          <a:prstGeom prst="straightConnector1">
-            <a:avLst/>
-          </a:prstGeom>
-          <a:ln w="19050">
-            <a:solidFill>
-              <a:srgbClr val="0070C0"/>
-            </a:solidFill>
-            <a:prstDash val="sysDash"/>
-            <a:headEnd type="arrow" w="med" len="med"/>
-            <a:tailEnd type="none" w="med" len="med"/>
-          </a:ln>
-        </p:spPr>
-        <p:style>
-          <a:lnRef idx="1">
-            <a:schemeClr val="accent1"/>
-          </a:lnRef>
-          <a:fillRef idx="0">
-            <a:schemeClr val="accent1"/>
-          </a:fillRef>
-          <a:effectRef idx="0">
-            <a:schemeClr val="accent1"/>
-          </a:effectRef>
-          <a:fontRef idx="minor">
-            <a:schemeClr val="tx1"/>
-          </a:fontRef>
-        </p:style>
-      </p:cxnSp>
       <p:sp>
         <p:nvSpPr>
           <p:cNvPr id="78" name="TextBox 77"/>
@@ -4644,8 +4562,8 @@
         </p:nvSpPr>
         <p:spPr>
           <a:xfrm>
-            <a:off x="6577715" y="4462627"/>
-            <a:ext cx="1817235" cy="276999"/>
+            <a:off x="9141539" y="5186892"/>
+            <a:ext cx="1817235" cy="138499"/>
           </a:xfrm>
           <a:prstGeom prst="rect">
             <a:avLst/>
@@ -4678,21 +4596,13 @@
               </a:rPr>
               <a:t>loadUserData</a:t>
             </a:r>
-            <a:endParaRPr lang="en-US" sz="900" dirty="0">
-              <a:solidFill>
-                <a:srgbClr val="7030A0"/>
-              </a:solidFill>
-            </a:endParaRPr>
-          </a:p>
-          <a:p>
-            <a:pPr algn="l"/>
             <a:r>
               <a:rPr lang="en-US" sz="900" dirty="0">
                 <a:solidFill>
                   <a:srgbClr val="7030A0"/>
                 </a:solidFill>
               </a:rPr>
-              <a:t>(username, password)</a:t>
+              <a:t>(credentials)</a:t>
             </a:r>
           </a:p>
         </p:txBody>
@@ -4705,7 +4615,7 @@
         </p:nvSpPr>
         <p:spPr>
           <a:xfrm>
-            <a:off x="3352800" y="1981200"/>
+            <a:off x="3352797" y="2221591"/>
             <a:ext cx="1042552" cy="184666"/>
           </a:xfrm>
           <a:prstGeom prst="rect">
@@ -4794,14 +4704,14 @@
       </p:sp>
       <p:sp>
         <p:nvSpPr>
-          <p:cNvPr id="82" name="TextBox 81"/>
+          <p:cNvPr id="83" name="TextBox 82"/>
           <p:cNvSpPr txBox="1"/>
           <p:nvPr/>
         </p:nvSpPr>
         <p:spPr>
           <a:xfrm>
-            <a:off x="4028361" y="8306918"/>
-            <a:ext cx="621216" cy="215444"/>
+            <a:off x="66386" y="7158440"/>
+            <a:ext cx="762000" cy="215444"/>
           </a:xfrm>
           <a:prstGeom prst="rect">
             <a:avLst/>
@@ -4834,14 +4744,369 @@
       </p:sp>
       <p:sp>
         <p:nvSpPr>
-          <p:cNvPr id="83" name="TextBox 82"/>
+          <p:cNvPr id="40" name="Rectangle 62"/>
+          <p:cNvSpPr/>
+          <p:nvPr/>
+        </p:nvSpPr>
+        <p:spPr>
+          <a:xfrm>
+            <a:off x="3850983" y="1667327"/>
+            <a:ext cx="1778201" cy="432035"/>
+          </a:xfrm>
+          <a:prstGeom prst="rect">
+            <a:avLst/>
+          </a:prstGeom>
+          <a:solidFill>
+            <a:srgbClr val="0070C0"/>
+          </a:solidFill>
+          <a:ln w="19050">
+            <a:solidFill>
+              <a:srgbClr val="0070C0"/>
+            </a:solidFill>
+          </a:ln>
+          <a:effectLst/>
+        </p:spPr>
+        <p:style>
+          <a:lnRef idx="1">
+            <a:schemeClr val="accent2"/>
+          </a:lnRef>
+          <a:fillRef idx="2">
+            <a:schemeClr val="accent2"/>
+          </a:fillRef>
+          <a:effectRef idx="1">
+            <a:schemeClr val="accent2"/>
+          </a:effectRef>
+          <a:fontRef idx="minor">
+            <a:schemeClr val="dk1"/>
+          </a:fontRef>
+        </p:style>
+        <p:txBody>
+          <a:bodyPr rtlCol="0" anchor="ctr"/>
+          <a:lstStyle/>
+          <a:p>
+            <a:pPr algn="ctr"/>
+            <a:r>
+              <a:rPr lang="en-US" sz="1600" dirty="0">
+                <a:solidFill>
+                  <a:schemeClr val="bg1"/>
+                </a:solidFill>
+              </a:rPr>
+              <a:t>p:LoginCommand</a:t>
+            </a:r>
+          </a:p>
+          <a:p>
+            <a:pPr algn="ctr"/>
+            <a:r>
+              <a:rPr lang="en-US" sz="1600" dirty="0">
+                <a:solidFill>
+                  <a:schemeClr val="bg1"/>
+                </a:solidFill>
+              </a:rPr>
+              <a:t>Parser</a:t>
+            </a:r>
+            <a:endParaRPr lang="en-SG" sz="1600" dirty="0">
+              <a:solidFill>
+                <a:schemeClr val="bg1"/>
+              </a:solidFill>
+            </a:endParaRPr>
+          </a:p>
+        </p:txBody>
+      </p:sp>
+      <p:cxnSp>
+        <p:nvCxnSpPr>
+          <p:cNvPr id="8" name="Straight Arrow Connector 7"/>
+          <p:cNvCxnSpPr>
+            <a:cxnSpLocks/>
+          </p:cNvCxnSpPr>
+          <p:nvPr/>
+        </p:nvCxnSpPr>
+        <p:spPr>
+          <a:xfrm flipV="1">
+            <a:off x="3031425" y="2450193"/>
+            <a:ext cx="1647519" cy="4542"/>
+          </a:xfrm>
+          <a:prstGeom prst="straightConnector1">
+            <a:avLst/>
+          </a:prstGeom>
+          <a:ln w="19050">
+            <a:headEnd type="none" w="med" len="med"/>
+            <a:tailEnd type="arrow" w="med" len="med"/>
+          </a:ln>
+        </p:spPr>
+        <p:style>
+          <a:lnRef idx="1">
+            <a:schemeClr val="accent1"/>
+          </a:lnRef>
+          <a:fillRef idx="0">
+            <a:schemeClr val="accent1"/>
+          </a:fillRef>
+          <a:effectRef idx="0">
+            <a:schemeClr val="accent1"/>
+          </a:effectRef>
+          <a:fontRef idx="minor">
+            <a:schemeClr val="tx1"/>
+          </a:fontRef>
+        </p:style>
+      </p:cxnSp>
+      <p:sp>
+        <p:nvSpPr>
+          <p:cNvPr id="45" name="Rectangle 44"/>
+          <p:cNvSpPr/>
+          <p:nvPr/>
+        </p:nvSpPr>
+        <p:spPr>
+          <a:xfrm>
+            <a:off x="4678949" y="2090288"/>
+            <a:ext cx="205843" cy="123165"/>
+          </a:xfrm>
+          <a:prstGeom prst="rect">
+            <a:avLst/>
+          </a:prstGeom>
+          <a:solidFill>
+            <a:srgbClr val="0070C0"/>
+          </a:solidFill>
+          <a:ln>
+            <a:solidFill>
+              <a:srgbClr val="0070C0"/>
+            </a:solidFill>
+          </a:ln>
+          <a:effectLst/>
+        </p:spPr>
+        <p:style>
+          <a:lnRef idx="1">
+            <a:schemeClr val="accent3"/>
+          </a:lnRef>
+          <a:fillRef idx="2">
+            <a:schemeClr val="accent3"/>
+          </a:fillRef>
+          <a:effectRef idx="1">
+            <a:schemeClr val="accent3"/>
+          </a:effectRef>
+          <a:fontRef idx="minor">
+            <a:schemeClr val="dk1"/>
+          </a:fontRef>
+        </p:style>
+        <p:txBody>
+          <a:bodyPr rtlCol="0" anchor="ctr"/>
+          <a:lstStyle/>
+          <a:p>
+            <a:pPr algn="ctr"/>
+            <a:endParaRPr lang="en-SG" sz="1400"/>
+          </a:p>
+        </p:txBody>
+      </p:sp>
+      <p:cxnSp>
+        <p:nvCxnSpPr>
+          <p:cNvPr id="46" name="Straight Connector 45"/>
+          <p:cNvCxnSpPr>
+            <a:cxnSpLocks/>
+            <a:stCxn id="45" idx="0"/>
+          </p:cNvCxnSpPr>
+          <p:nvPr/>
+        </p:nvCxnSpPr>
+        <p:spPr>
+          <a:xfrm flipH="1">
+            <a:off x="4778555" y="2090288"/>
+            <a:ext cx="3316" cy="2913321"/>
+          </a:xfrm>
+          <a:prstGeom prst="line">
+            <a:avLst/>
+          </a:prstGeom>
+          <a:ln w="19050">
+            <a:solidFill>
+              <a:srgbClr val="0070C0"/>
+            </a:solidFill>
+            <a:prstDash val="sysDash"/>
+          </a:ln>
+          <a:effectLst/>
+        </p:spPr>
+        <p:style>
+          <a:lnRef idx="1">
+            <a:schemeClr val="accent1"/>
+          </a:lnRef>
+          <a:fillRef idx="2">
+            <a:schemeClr val="accent1"/>
+          </a:fillRef>
+          <a:effectRef idx="1">
+            <a:schemeClr val="accent1"/>
+          </a:effectRef>
+          <a:fontRef idx="minor">
+            <a:schemeClr val="dk1"/>
+          </a:fontRef>
+        </p:style>
+      </p:cxnSp>
+      <p:sp>
+        <p:nvSpPr>
+          <p:cNvPr id="49" name="Rectangle 48"/>
+          <p:cNvSpPr/>
+          <p:nvPr/>
+        </p:nvSpPr>
+        <p:spPr>
+          <a:xfrm>
+            <a:off x="4703952" y="2456343"/>
+            <a:ext cx="161111" cy="2283208"/>
+          </a:xfrm>
+          <a:prstGeom prst="rect">
+            <a:avLst/>
+          </a:prstGeom>
+          <a:solidFill>
+            <a:srgbClr val="0070C0"/>
+          </a:solidFill>
+          <a:ln>
+            <a:solidFill>
+              <a:srgbClr val="0070C0"/>
+            </a:solidFill>
+          </a:ln>
+          <a:effectLst/>
+        </p:spPr>
+        <p:style>
+          <a:lnRef idx="1">
+            <a:schemeClr val="accent3"/>
+          </a:lnRef>
+          <a:fillRef idx="2">
+            <a:schemeClr val="accent3"/>
+          </a:fillRef>
+          <a:effectRef idx="1">
+            <a:schemeClr val="accent3"/>
+          </a:effectRef>
+          <a:fontRef idx="minor">
+            <a:schemeClr val="dk1"/>
+          </a:fontRef>
+        </p:style>
+        <p:txBody>
+          <a:bodyPr rtlCol="0" anchor="ctr"/>
+          <a:lstStyle/>
+          <a:p>
+            <a:pPr algn="ctr"/>
+            <a:endParaRPr lang="en-SG" sz="1400"/>
+          </a:p>
+        </p:txBody>
+      </p:sp>
+      <p:cxnSp>
+        <p:nvCxnSpPr>
+          <p:cNvPr id="50" name="Straight Arrow Connector 49"/>
+          <p:cNvCxnSpPr/>
+          <p:nvPr/>
+        </p:nvCxnSpPr>
+        <p:spPr>
+          <a:xfrm>
+            <a:off x="3031425" y="1649006"/>
+            <a:ext cx="819556" cy="1"/>
+          </a:xfrm>
+          <a:prstGeom prst="straightConnector1">
+            <a:avLst/>
+          </a:prstGeom>
+          <a:ln w="19050">
+            <a:solidFill>
+              <a:srgbClr val="0070C0"/>
+            </a:solidFill>
+            <a:tailEnd type="arrow"/>
+          </a:ln>
+        </p:spPr>
+        <p:style>
+          <a:lnRef idx="1">
+            <a:schemeClr val="accent1"/>
+          </a:lnRef>
+          <a:fillRef idx="0">
+            <a:schemeClr val="accent1"/>
+          </a:fillRef>
+          <a:effectRef idx="0">
+            <a:schemeClr val="accent1"/>
+          </a:effectRef>
+          <a:fontRef idx="minor">
+            <a:schemeClr val="tx1"/>
+          </a:fontRef>
+        </p:style>
+      </p:cxnSp>
+      <p:cxnSp>
+        <p:nvCxnSpPr>
+          <p:cNvPr id="52" name="Straight Arrow Connector 51"/>
+          <p:cNvCxnSpPr>
+            <a:cxnSpLocks/>
+          </p:cNvCxnSpPr>
+          <p:nvPr/>
+        </p:nvCxnSpPr>
+        <p:spPr>
+          <a:xfrm>
+            <a:off x="3052237" y="2209800"/>
+            <a:ext cx="1600428" cy="3653"/>
+          </a:xfrm>
+          <a:prstGeom prst="straightConnector1">
+            <a:avLst/>
+          </a:prstGeom>
+          <a:ln w="19050">
+            <a:solidFill>
+              <a:srgbClr val="0070C0"/>
+            </a:solidFill>
+            <a:prstDash val="sysDash"/>
+            <a:headEnd type="arrow" w="med" len="med"/>
+            <a:tailEnd type="none" w="med" len="med"/>
+          </a:ln>
+        </p:spPr>
+        <p:style>
+          <a:lnRef idx="1">
+            <a:schemeClr val="accent1"/>
+          </a:lnRef>
+          <a:fillRef idx="0">
+            <a:schemeClr val="accent1"/>
+          </a:fillRef>
+          <a:effectRef idx="0">
+            <a:schemeClr val="accent1"/>
+          </a:effectRef>
+          <a:fontRef idx="minor">
+            <a:schemeClr val="tx1"/>
+          </a:fontRef>
+        </p:style>
+      </p:cxnSp>
+      <p:sp>
+        <p:nvSpPr>
+          <p:cNvPr id="4" name="TextBox 3"/>
           <p:cNvSpPr txBox="1"/>
           <p:nvPr/>
         </p:nvSpPr>
         <p:spPr>
           <a:xfrm>
-            <a:off x="40532" y="8533932"/>
-            <a:ext cx="762000" cy="215444"/>
+            <a:off x="4656769" y="4951193"/>
+            <a:ext cx="258404" cy="261610"/>
+          </a:xfrm>
+          <a:prstGeom prst="rect">
+            <a:avLst/>
+          </a:prstGeom>
+          <a:noFill/>
+        </p:spPr>
+        <p:txBody>
+          <a:bodyPr wrap="none" rtlCol="0">
+            <a:spAutoFit/>
+          </a:bodyPr>
+          <a:lstStyle/>
+          <a:p>
+            <a:r>
+              <a:rPr lang="en-SG" sz="1100" dirty="0">
+                <a:solidFill>
+                  <a:srgbClr val="002060"/>
+                </a:solidFill>
+              </a:rPr>
+              <a:t>X</a:t>
+            </a:r>
+          </a:p>
+        </p:txBody>
+      </p:sp>
+      <p:sp>
+        <p:nvSpPr>
+          <p:cNvPr id="59" name="TextBox 58">
+            <a:extLst>
+              <a:ext uri="{FF2B5EF4-FFF2-40B4-BE49-F238E27FC236}">
+                <a16:creationId xmlns:a16="http://schemas.microsoft.com/office/drawing/2014/main" id="{B9B09D9F-91AC-48A0-8B89-1AADAB94CDD2}"/>
+              </a:ext>
+            </a:extLst>
+          </p:cNvPr>
+          <p:cNvSpPr txBox="1"/>
+          <p:nvPr/>
+        </p:nvSpPr>
+        <p:spPr>
+          <a:xfrm>
+            <a:off x="7088187" y="3607137"/>
+            <a:ext cx="1722066" cy="276999"/>
           </a:xfrm>
           <a:prstGeom prst="rect">
             <a:avLst/>
@@ -4865,637 +5130,6 @@
             </a:lvl1pPr>
           </a:lstStyle>
           <a:p>
-            <a:r>
-              <a:rPr lang="en-US" dirty="0"/>
-              <a:t>result</a:t>
-            </a:r>
-          </a:p>
-        </p:txBody>
-      </p:sp>
-      <p:sp>
-        <p:nvSpPr>
-          <p:cNvPr id="84" name="Rectangle 62"/>
-          <p:cNvSpPr/>
-          <p:nvPr/>
-        </p:nvSpPr>
-        <p:spPr>
-          <a:xfrm>
-            <a:off x="6622504" y="7821901"/>
-            <a:ext cx="1590354" cy="461538"/>
-          </a:xfrm>
-          <a:prstGeom prst="rect">
-            <a:avLst/>
-          </a:prstGeom>
-          <a:solidFill>
-            <a:srgbClr val="0070C0"/>
-          </a:solidFill>
-          <a:ln w="19050">
-            <a:solidFill>
-              <a:srgbClr val="0070C0"/>
-            </a:solidFill>
-          </a:ln>
-          <a:effectLst/>
-        </p:spPr>
-        <p:style>
-          <a:lnRef idx="1">
-            <a:schemeClr val="accent2"/>
-          </a:lnRef>
-          <a:fillRef idx="2">
-            <a:schemeClr val="accent2"/>
-          </a:fillRef>
-          <a:effectRef idx="1">
-            <a:schemeClr val="accent2"/>
-          </a:effectRef>
-          <a:fontRef idx="minor">
-            <a:schemeClr val="dk1"/>
-          </a:fontRef>
-        </p:style>
-        <p:txBody>
-          <a:bodyPr rtlCol="0" anchor="ctr"/>
-          <a:lstStyle/>
-          <a:p>
-            <a:pPr algn="ctr"/>
-            <a:r>
-              <a:rPr lang="en-US" sz="1600" dirty="0" err="1">
-                <a:solidFill>
-                  <a:schemeClr val="bg1"/>
-                </a:solidFill>
-              </a:rPr>
-              <a:t>result:Command</a:t>
-            </a:r>
-            <a:r>
-              <a:rPr lang="en-US" sz="1600" dirty="0">
-                <a:solidFill>
-                  <a:schemeClr val="bg1"/>
-                </a:solidFill>
-              </a:rPr>
-              <a:t> Result</a:t>
-            </a:r>
-            <a:endParaRPr lang="en-SG" sz="1600" dirty="0">
-              <a:solidFill>
-                <a:schemeClr val="bg1"/>
-              </a:solidFill>
-            </a:endParaRPr>
-          </a:p>
-        </p:txBody>
-      </p:sp>
-      <p:sp>
-        <p:nvSpPr>
-          <p:cNvPr id="86" name="Rectangle 85"/>
-          <p:cNvSpPr/>
-          <p:nvPr/>
-        </p:nvSpPr>
-        <p:spPr>
-          <a:xfrm>
-            <a:off x="7379581" y="8283439"/>
-            <a:ext cx="152400" cy="171376"/>
-          </a:xfrm>
-          <a:prstGeom prst="rect">
-            <a:avLst/>
-          </a:prstGeom>
-          <a:solidFill>
-            <a:srgbClr val="0070C0"/>
-          </a:solidFill>
-          <a:ln>
-            <a:solidFill>
-              <a:srgbClr val="0070C0"/>
-            </a:solidFill>
-          </a:ln>
-          <a:effectLst/>
-        </p:spPr>
-        <p:style>
-          <a:lnRef idx="1">
-            <a:schemeClr val="accent3"/>
-          </a:lnRef>
-          <a:fillRef idx="2">
-            <a:schemeClr val="accent3"/>
-          </a:fillRef>
-          <a:effectRef idx="1">
-            <a:schemeClr val="accent3"/>
-          </a:effectRef>
-          <a:fontRef idx="minor">
-            <a:schemeClr val="dk1"/>
-          </a:fontRef>
-        </p:style>
-        <p:txBody>
-          <a:bodyPr rtlCol="0" anchor="ctr"/>
-          <a:lstStyle/>
-          <a:p>
-            <a:pPr algn="ctr"/>
-            <a:endParaRPr lang="en-SG" sz="1400"/>
-          </a:p>
-        </p:txBody>
-      </p:sp>
-      <p:cxnSp>
-        <p:nvCxnSpPr>
-          <p:cNvPr id="90" name="Straight Arrow Connector 89"/>
-          <p:cNvCxnSpPr/>
-          <p:nvPr/>
-        </p:nvCxnSpPr>
-        <p:spPr>
-          <a:xfrm>
-            <a:off x="6460258" y="8454815"/>
-            <a:ext cx="966624" cy="0"/>
-          </a:xfrm>
-          <a:prstGeom prst="straightConnector1">
-            <a:avLst/>
-          </a:prstGeom>
-          <a:ln w="19050">
-            <a:solidFill>
-              <a:srgbClr val="0070C0"/>
-            </a:solidFill>
-            <a:prstDash val="sysDash"/>
-            <a:headEnd type="arrow" w="med" len="med"/>
-            <a:tailEnd type="none" w="med" len="med"/>
-          </a:ln>
-        </p:spPr>
-        <p:style>
-          <a:lnRef idx="1">
-            <a:schemeClr val="accent1"/>
-          </a:lnRef>
-          <a:fillRef idx="0">
-            <a:schemeClr val="accent1"/>
-          </a:fillRef>
-          <a:effectRef idx="0">
-            <a:schemeClr val="accent1"/>
-          </a:effectRef>
-          <a:fontRef idx="minor">
-            <a:schemeClr val="tx1"/>
-          </a:fontRef>
-        </p:style>
-      </p:cxnSp>
-      <p:sp>
-        <p:nvSpPr>
-          <p:cNvPr id="40" name="Rectangle 62"/>
-          <p:cNvSpPr/>
-          <p:nvPr/>
-        </p:nvSpPr>
-        <p:spPr>
-          <a:xfrm>
-            <a:off x="3850983" y="1405841"/>
-            <a:ext cx="1778201" cy="432035"/>
-          </a:xfrm>
-          <a:prstGeom prst="rect">
-            <a:avLst/>
-          </a:prstGeom>
-          <a:solidFill>
-            <a:srgbClr val="0070C0"/>
-          </a:solidFill>
-          <a:ln w="19050">
-            <a:solidFill>
-              <a:srgbClr val="0070C0"/>
-            </a:solidFill>
-          </a:ln>
-          <a:effectLst/>
-        </p:spPr>
-        <p:style>
-          <a:lnRef idx="1">
-            <a:schemeClr val="accent2"/>
-          </a:lnRef>
-          <a:fillRef idx="2">
-            <a:schemeClr val="accent2"/>
-          </a:fillRef>
-          <a:effectRef idx="1">
-            <a:schemeClr val="accent2"/>
-          </a:effectRef>
-          <a:fontRef idx="minor">
-            <a:schemeClr val="dk1"/>
-          </a:fontRef>
-        </p:style>
-        <p:txBody>
-          <a:bodyPr rtlCol="0" anchor="ctr"/>
-          <a:lstStyle/>
-          <a:p>
-            <a:pPr algn="ctr"/>
-            <a:r>
-              <a:rPr lang="en-US" sz="1600" dirty="0">
-                <a:solidFill>
-                  <a:schemeClr val="bg1"/>
-                </a:solidFill>
-              </a:rPr>
-              <a:t>:</a:t>
-            </a:r>
-            <a:r>
-              <a:rPr lang="en-US" sz="1600" dirty="0" err="1">
-                <a:solidFill>
-                  <a:schemeClr val="bg1"/>
-                </a:solidFill>
-              </a:rPr>
-              <a:t>LoginCommand</a:t>
-            </a:r>
-            <a:endParaRPr lang="en-US" sz="1600" dirty="0">
-              <a:solidFill>
-                <a:schemeClr val="bg1"/>
-              </a:solidFill>
-            </a:endParaRPr>
-          </a:p>
-          <a:p>
-            <a:pPr algn="ctr"/>
-            <a:r>
-              <a:rPr lang="en-US" sz="1600" dirty="0">
-                <a:solidFill>
-                  <a:schemeClr val="bg1"/>
-                </a:solidFill>
-              </a:rPr>
-              <a:t>Parser</a:t>
-            </a:r>
-            <a:endParaRPr lang="en-SG" sz="1600" dirty="0">
-              <a:solidFill>
-                <a:schemeClr val="bg1"/>
-              </a:solidFill>
-            </a:endParaRPr>
-          </a:p>
-        </p:txBody>
-      </p:sp>
-      <p:cxnSp>
-        <p:nvCxnSpPr>
-          <p:cNvPr id="8" name="Straight Arrow Connector 7"/>
-          <p:cNvCxnSpPr/>
-          <p:nvPr/>
-        </p:nvCxnSpPr>
-        <p:spPr>
-          <a:xfrm>
-            <a:off x="3081591" y="2209801"/>
-            <a:ext cx="1597356" cy="1"/>
-          </a:xfrm>
-          <a:prstGeom prst="straightConnector1">
-            <a:avLst/>
-          </a:prstGeom>
-          <a:ln w="19050">
-            <a:headEnd type="none" w="med" len="med"/>
-            <a:tailEnd type="arrow" w="med" len="med"/>
-          </a:ln>
-        </p:spPr>
-        <p:style>
-          <a:lnRef idx="1">
-            <a:schemeClr val="accent1"/>
-          </a:lnRef>
-          <a:fillRef idx="0">
-            <a:schemeClr val="accent1"/>
-          </a:fillRef>
-          <a:effectRef idx="0">
-            <a:schemeClr val="accent1"/>
-          </a:effectRef>
-          <a:fontRef idx="minor">
-            <a:schemeClr val="tx1"/>
-          </a:fontRef>
-        </p:style>
-      </p:cxnSp>
-      <p:sp>
-        <p:nvSpPr>
-          <p:cNvPr id="45" name="Rectangle 44"/>
-          <p:cNvSpPr/>
-          <p:nvPr/>
-        </p:nvSpPr>
-        <p:spPr>
-          <a:xfrm>
-            <a:off x="4678949" y="1828802"/>
-            <a:ext cx="205843" cy="123165"/>
-          </a:xfrm>
-          <a:prstGeom prst="rect">
-            <a:avLst/>
-          </a:prstGeom>
-          <a:solidFill>
-            <a:srgbClr val="0070C0"/>
-          </a:solidFill>
-          <a:ln>
-            <a:solidFill>
-              <a:srgbClr val="0070C0"/>
-            </a:solidFill>
-          </a:ln>
-          <a:effectLst/>
-        </p:spPr>
-        <p:style>
-          <a:lnRef idx="1">
-            <a:schemeClr val="accent3"/>
-          </a:lnRef>
-          <a:fillRef idx="2">
-            <a:schemeClr val="accent3"/>
-          </a:fillRef>
-          <a:effectRef idx="1">
-            <a:schemeClr val="accent3"/>
-          </a:effectRef>
-          <a:fontRef idx="minor">
-            <a:schemeClr val="dk1"/>
-          </a:fontRef>
-        </p:style>
-        <p:txBody>
-          <a:bodyPr rtlCol="0" anchor="ctr"/>
-          <a:lstStyle/>
-          <a:p>
-            <a:pPr algn="ctr"/>
-            <a:endParaRPr lang="en-SG" sz="1400"/>
-          </a:p>
-        </p:txBody>
-      </p:sp>
-      <p:cxnSp>
-        <p:nvCxnSpPr>
-          <p:cNvPr id="46" name="Straight Connector 45"/>
-          <p:cNvCxnSpPr>
-            <a:cxnSpLocks/>
-            <a:stCxn id="45" idx="0"/>
-            <a:endCxn id="4" idx="0"/>
-          </p:cNvCxnSpPr>
-          <p:nvPr/>
-        </p:nvCxnSpPr>
-        <p:spPr>
-          <a:xfrm flipH="1">
-            <a:off x="4781867" y="1828800"/>
-            <a:ext cx="2" cy="2557790"/>
-          </a:xfrm>
-          <a:prstGeom prst="line">
-            <a:avLst/>
-          </a:prstGeom>
-          <a:ln w="19050">
-            <a:solidFill>
-              <a:srgbClr val="0070C0"/>
-            </a:solidFill>
-            <a:prstDash val="sysDash"/>
-          </a:ln>
-          <a:effectLst/>
-        </p:spPr>
-        <p:style>
-          <a:lnRef idx="1">
-            <a:schemeClr val="accent1"/>
-          </a:lnRef>
-          <a:fillRef idx="2">
-            <a:schemeClr val="accent1"/>
-          </a:fillRef>
-          <a:effectRef idx="1">
-            <a:schemeClr val="accent1"/>
-          </a:effectRef>
-          <a:fontRef idx="minor">
-            <a:schemeClr val="dk1"/>
-          </a:fontRef>
-        </p:style>
-      </p:cxnSp>
-      <p:sp>
-        <p:nvSpPr>
-          <p:cNvPr id="49" name="Rectangle 48"/>
-          <p:cNvSpPr/>
-          <p:nvPr/>
-        </p:nvSpPr>
-        <p:spPr>
-          <a:xfrm>
-            <a:off x="4678950" y="2193731"/>
-            <a:ext cx="161111" cy="1895915"/>
-          </a:xfrm>
-          <a:prstGeom prst="rect">
-            <a:avLst/>
-          </a:prstGeom>
-          <a:solidFill>
-            <a:srgbClr val="0070C0"/>
-          </a:solidFill>
-          <a:ln>
-            <a:solidFill>
-              <a:srgbClr val="0070C0"/>
-            </a:solidFill>
-          </a:ln>
-          <a:effectLst/>
-        </p:spPr>
-        <p:style>
-          <a:lnRef idx="1">
-            <a:schemeClr val="accent3"/>
-          </a:lnRef>
-          <a:fillRef idx="2">
-            <a:schemeClr val="accent3"/>
-          </a:fillRef>
-          <a:effectRef idx="1">
-            <a:schemeClr val="accent3"/>
-          </a:effectRef>
-          <a:fontRef idx="minor">
-            <a:schemeClr val="dk1"/>
-          </a:fontRef>
-        </p:style>
-        <p:txBody>
-          <a:bodyPr rtlCol="0" anchor="ctr"/>
-          <a:lstStyle/>
-          <a:p>
-            <a:pPr algn="ctr"/>
-            <a:endParaRPr lang="en-SG" sz="1400"/>
-          </a:p>
-        </p:txBody>
-      </p:sp>
-      <p:cxnSp>
-        <p:nvCxnSpPr>
-          <p:cNvPr id="51" name="Straight Arrow Connector 50"/>
-          <p:cNvCxnSpPr/>
-          <p:nvPr/>
-        </p:nvCxnSpPr>
-        <p:spPr>
-          <a:xfrm>
-            <a:off x="3118384" y="3124200"/>
-            <a:ext cx="1667219" cy="0"/>
-          </a:xfrm>
-          <a:prstGeom prst="straightConnector1">
-            <a:avLst/>
-          </a:prstGeom>
-          <a:ln w="19050">
-            <a:solidFill>
-              <a:srgbClr val="0070C0"/>
-            </a:solidFill>
-            <a:prstDash val="sysDash"/>
-            <a:headEnd type="arrow" w="med" len="med"/>
-            <a:tailEnd type="none" w="med" len="med"/>
-          </a:ln>
-        </p:spPr>
-        <p:style>
-          <a:lnRef idx="1">
-            <a:schemeClr val="accent1"/>
-          </a:lnRef>
-          <a:fillRef idx="0">
-            <a:schemeClr val="accent1"/>
-          </a:fillRef>
-          <a:effectRef idx="0">
-            <a:schemeClr val="accent1"/>
-          </a:effectRef>
-          <a:fontRef idx="minor">
-            <a:schemeClr val="tx1"/>
-          </a:fontRef>
-        </p:style>
-      </p:cxnSp>
-      <p:cxnSp>
-        <p:nvCxnSpPr>
-          <p:cNvPr id="13" name="Straight Arrow Connector 12"/>
-          <p:cNvCxnSpPr>
-            <a:cxnSpLocks/>
-          </p:cNvCxnSpPr>
-          <p:nvPr/>
-        </p:nvCxnSpPr>
-        <p:spPr>
-          <a:xfrm>
-            <a:off x="6460258" y="7821901"/>
-            <a:ext cx="162246" cy="0"/>
-          </a:xfrm>
-          <a:prstGeom prst="straightConnector1">
-            <a:avLst/>
-          </a:prstGeom>
-          <a:ln w="19050">
-            <a:headEnd type="none" w="med" len="med"/>
-            <a:tailEnd type="arrow" w="med" len="med"/>
-          </a:ln>
-        </p:spPr>
-        <p:style>
-          <a:lnRef idx="1">
-            <a:schemeClr val="accent1"/>
-          </a:lnRef>
-          <a:fillRef idx="0">
-            <a:schemeClr val="accent1"/>
-          </a:fillRef>
-          <a:effectRef idx="0">
-            <a:schemeClr val="accent1"/>
-          </a:effectRef>
-          <a:fontRef idx="minor">
-            <a:schemeClr val="tx1"/>
-          </a:fontRef>
-        </p:style>
-      </p:cxnSp>
-      <p:cxnSp>
-        <p:nvCxnSpPr>
-          <p:cNvPr id="50" name="Straight Arrow Connector 49"/>
-          <p:cNvCxnSpPr/>
-          <p:nvPr/>
-        </p:nvCxnSpPr>
-        <p:spPr>
-          <a:xfrm>
-            <a:off x="3031425" y="1649006"/>
-            <a:ext cx="819556" cy="1"/>
-          </a:xfrm>
-          <a:prstGeom prst="straightConnector1">
-            <a:avLst/>
-          </a:prstGeom>
-          <a:ln w="19050">
-            <a:solidFill>
-              <a:srgbClr val="0070C0"/>
-            </a:solidFill>
-            <a:tailEnd type="arrow"/>
-          </a:ln>
-        </p:spPr>
-        <p:style>
-          <a:lnRef idx="1">
-            <a:schemeClr val="accent1"/>
-          </a:lnRef>
-          <a:fillRef idx="0">
-            <a:schemeClr val="accent1"/>
-          </a:fillRef>
-          <a:effectRef idx="0">
-            <a:schemeClr val="accent1"/>
-          </a:effectRef>
-          <a:fontRef idx="minor">
-            <a:schemeClr val="tx1"/>
-          </a:fontRef>
-        </p:style>
-      </p:cxnSp>
-      <p:cxnSp>
-        <p:nvCxnSpPr>
-          <p:cNvPr id="52" name="Straight Arrow Connector 51"/>
-          <p:cNvCxnSpPr/>
-          <p:nvPr/>
-        </p:nvCxnSpPr>
-        <p:spPr>
-          <a:xfrm>
-            <a:off x="3078519" y="1951965"/>
-            <a:ext cx="1600428" cy="0"/>
-          </a:xfrm>
-          <a:prstGeom prst="straightConnector1">
-            <a:avLst/>
-          </a:prstGeom>
-          <a:ln w="19050">
-            <a:solidFill>
-              <a:srgbClr val="0070C0"/>
-            </a:solidFill>
-            <a:prstDash val="sysDash"/>
-            <a:headEnd type="arrow" w="med" len="med"/>
-            <a:tailEnd type="none" w="med" len="med"/>
-          </a:ln>
-        </p:spPr>
-        <p:style>
-          <a:lnRef idx="1">
-            <a:schemeClr val="accent1"/>
-          </a:lnRef>
-          <a:fillRef idx="0">
-            <a:schemeClr val="accent1"/>
-          </a:fillRef>
-          <a:effectRef idx="0">
-            <a:schemeClr val="accent1"/>
-          </a:effectRef>
-          <a:fontRef idx="minor">
-            <a:schemeClr val="tx1"/>
-          </a:fontRef>
-        </p:style>
-      </p:cxnSp>
-      <p:sp>
-        <p:nvSpPr>
-          <p:cNvPr id="4" name="TextBox 3"/>
-          <p:cNvSpPr txBox="1"/>
-          <p:nvPr/>
-        </p:nvSpPr>
-        <p:spPr>
-          <a:xfrm>
-            <a:off x="4652665" y="4386590"/>
-            <a:ext cx="258404" cy="261610"/>
-          </a:xfrm>
-          <a:prstGeom prst="rect">
-            <a:avLst/>
-          </a:prstGeom>
-          <a:noFill/>
-        </p:spPr>
-        <p:txBody>
-          <a:bodyPr wrap="none" rtlCol="0">
-            <a:spAutoFit/>
-          </a:bodyPr>
-          <a:lstStyle/>
-          <a:p>
-            <a:r>
-              <a:rPr lang="en-SG" sz="1100" dirty="0">
-                <a:solidFill>
-                  <a:srgbClr val="002060"/>
-                </a:solidFill>
-              </a:rPr>
-              <a:t>X</a:t>
-            </a:r>
-          </a:p>
-        </p:txBody>
-      </p:sp>
-      <p:sp>
-        <p:nvSpPr>
-          <p:cNvPr id="59" name="TextBox 58">
-            <a:extLst>
-              <a:ext uri="{FF2B5EF4-FFF2-40B4-BE49-F238E27FC236}">
-                <a16:creationId xmlns:a16="http://schemas.microsoft.com/office/drawing/2014/main" id="{B9B09D9F-91AC-48A0-8B89-1AADAB94CDD2}"/>
-              </a:ext>
-            </a:extLst>
-          </p:cNvPr>
-          <p:cNvSpPr txBox="1"/>
-          <p:nvPr/>
-        </p:nvSpPr>
-        <p:spPr>
-          <a:xfrm>
-            <a:off x="4872607" y="2405336"/>
-            <a:ext cx="1722066" cy="276999"/>
-          </a:xfrm>
-          <a:prstGeom prst="rect">
-            <a:avLst/>
-          </a:prstGeom>
-          <a:noFill/>
-        </p:spPr>
-        <p:txBody>
-          <a:bodyPr wrap="square" lIns="0" tIns="0" rIns="0" bIns="0" rtlCol="0">
-            <a:spAutoFit/>
-          </a:bodyPr>
-          <a:lstStyle>
-            <a:defPPr>
-              <a:defRPr lang="en-US"/>
-            </a:defPPr>
-            <a:lvl1pPr algn="r">
-              <a:defRPr sz="1400">
-                <a:solidFill>
-                  <a:srgbClr val="0070C0"/>
-                </a:solidFill>
-              </a:defRPr>
-            </a:lvl1pPr>
-          </a:lstStyle>
-          <a:p>
             <a:pPr algn="l"/>
             <a:r>
               <a:rPr lang="en-US" sz="900" dirty="0"/>
@@ -5511,7 +5145,7 @@
             <a:pPr algn="l"/>
             <a:r>
               <a:rPr lang="en-US" sz="900" dirty="0"/>
-              <a:t>(username, password)</a:t>
+              <a:t>(credentials)</a:t>
             </a:r>
           </a:p>
         </p:txBody>
@@ -5525,13 +5159,15 @@
               </a:ext>
             </a:extLst>
           </p:cNvPr>
-          <p:cNvCxnSpPr/>
+          <p:cNvCxnSpPr>
+            <a:cxnSpLocks/>
+          </p:cNvCxnSpPr>
           <p:nvPr/>
         </p:nvCxnSpPr>
         <p:spPr>
           <a:xfrm>
-            <a:off x="3071573" y="3733802"/>
-            <a:ext cx="1667219" cy="0"/>
+            <a:off x="1263580" y="4736000"/>
+            <a:ext cx="3476503" cy="3552"/>
           </a:xfrm>
           <a:prstGeom prst="straightConnector1">
             <a:avLst/>
@@ -5576,9 +5212,9 @@
           <p:nvPr/>
         </p:nvCxnSpPr>
         <p:spPr>
-          <a:xfrm>
-            <a:off x="6484369" y="5616789"/>
-            <a:ext cx="2384690" cy="7470"/>
+          <a:xfrm flipV="1">
+            <a:off x="8705574" y="6264433"/>
+            <a:ext cx="2827773" cy="3792"/>
           </a:xfrm>
           <a:prstGeom prst="straightConnector1">
             <a:avLst/>
@@ -5612,232 +5248,10 @@
       </p:cxnSp>
       <p:sp>
         <p:nvSpPr>
-          <p:cNvPr id="89" name="Rectangle 62">
+          <p:cNvPr id="93" name="TextBox 92">
             <a:extLst>
               <a:ext uri="{FF2B5EF4-FFF2-40B4-BE49-F238E27FC236}">
-                <a16:creationId xmlns:a16="http://schemas.microsoft.com/office/drawing/2014/main" id="{A2E36187-FBFC-4322-9BD3-C0B3F638E5DF}"/>
-              </a:ext>
-            </a:extLst>
-          </p:cNvPr>
-          <p:cNvSpPr/>
-          <p:nvPr/>
-        </p:nvSpPr>
-        <p:spPr>
-          <a:xfrm>
-            <a:off x="10954606" y="885689"/>
-            <a:ext cx="1335297" cy="304800"/>
-          </a:xfrm>
-          <a:prstGeom prst="rect">
-            <a:avLst/>
-          </a:prstGeom>
-          <a:solidFill>
-            <a:schemeClr val="accent3">
-              <a:lumMod val="60000"/>
-              <a:lumOff val="40000"/>
-            </a:schemeClr>
-          </a:solidFill>
-          <a:ln w="19050">
-            <a:solidFill>
-              <a:schemeClr val="accent3">
-                <a:lumMod val="60000"/>
-                <a:lumOff val="40000"/>
-              </a:schemeClr>
-            </a:solidFill>
-          </a:ln>
-          <a:effectLst/>
-        </p:spPr>
-        <p:style>
-          <a:lnRef idx="1">
-            <a:schemeClr val="accent2"/>
-          </a:lnRef>
-          <a:fillRef idx="2">
-            <a:schemeClr val="accent2"/>
-          </a:fillRef>
-          <a:effectRef idx="1">
-            <a:schemeClr val="accent2"/>
-          </a:effectRef>
-          <a:fontRef idx="minor">
-            <a:schemeClr val="dk1"/>
-          </a:fontRef>
-        </p:style>
-        <p:txBody>
-          <a:bodyPr rtlCol="0" anchor="ctr"/>
-          <a:lstStyle/>
-          <a:p>
-            <a:pPr algn="ctr"/>
-            <a:r>
-              <a:rPr lang="en-US" sz="1600" dirty="0">
-                <a:solidFill>
-                  <a:schemeClr val="bg1"/>
-                </a:solidFill>
-              </a:rPr>
-              <a:t>:</a:t>
-            </a:r>
-            <a:r>
-              <a:rPr lang="en-US" sz="1600" dirty="0" err="1">
-                <a:solidFill>
-                  <a:schemeClr val="bg1"/>
-                </a:solidFill>
-              </a:rPr>
-              <a:t>EventsCenter</a:t>
-            </a:r>
-            <a:endParaRPr lang="en-SG" sz="1600" dirty="0">
-              <a:solidFill>
-                <a:schemeClr val="bg1"/>
-              </a:solidFill>
-            </a:endParaRPr>
-          </a:p>
-        </p:txBody>
-      </p:sp>
-      <p:cxnSp>
-        <p:nvCxnSpPr>
-          <p:cNvPr id="91" name="Straight Connector 90">
-            <a:extLst>
-              <a:ext uri="{FF2B5EF4-FFF2-40B4-BE49-F238E27FC236}">
-                <a16:creationId xmlns:a16="http://schemas.microsoft.com/office/drawing/2014/main" id="{C8A5A93F-7528-4ABF-85ED-9FE1A99CA5B1}"/>
-              </a:ext>
-            </a:extLst>
-          </p:cNvPr>
-          <p:cNvCxnSpPr>
-            <a:cxnSpLocks/>
-            <a:stCxn id="89" idx="2"/>
-          </p:cNvCxnSpPr>
-          <p:nvPr/>
-        </p:nvCxnSpPr>
-        <p:spPr>
-          <a:xfrm flipH="1">
-            <a:off x="11612369" y="1190489"/>
-            <a:ext cx="9886" cy="7703403"/>
-          </a:xfrm>
-          <a:prstGeom prst="line">
-            <a:avLst/>
-          </a:prstGeom>
-          <a:ln w="19050">
-            <a:solidFill>
-              <a:schemeClr val="accent3">
-                <a:lumMod val="60000"/>
-                <a:lumOff val="40000"/>
-              </a:schemeClr>
-            </a:solidFill>
-            <a:prstDash val="sysDash"/>
-          </a:ln>
-          <a:effectLst/>
-        </p:spPr>
-        <p:style>
-          <a:lnRef idx="1">
-            <a:schemeClr val="accent1"/>
-          </a:lnRef>
-          <a:fillRef idx="2">
-            <a:schemeClr val="accent1"/>
-          </a:fillRef>
-          <a:effectRef idx="1">
-            <a:schemeClr val="accent1"/>
-          </a:effectRef>
-          <a:fontRef idx="minor">
-            <a:schemeClr val="dk1"/>
-          </a:fontRef>
-        </p:style>
-      </p:cxnSp>
-      <p:cxnSp>
-        <p:nvCxnSpPr>
-          <p:cNvPr id="92" name="Straight Arrow Connector 91">
-            <a:extLst>
-              <a:ext uri="{FF2B5EF4-FFF2-40B4-BE49-F238E27FC236}">
-                <a16:creationId xmlns:a16="http://schemas.microsoft.com/office/drawing/2014/main" id="{BE3258C4-3AF5-438A-B7F5-17558C81B7EB}"/>
-              </a:ext>
-            </a:extLst>
-          </p:cNvPr>
-          <p:cNvCxnSpPr>
-            <a:cxnSpLocks/>
-          </p:cNvCxnSpPr>
-          <p:nvPr/>
-        </p:nvCxnSpPr>
-        <p:spPr>
-          <a:xfrm>
-            <a:off x="6477875" y="7089505"/>
-            <a:ext cx="5058956" cy="0"/>
-          </a:xfrm>
-          <a:prstGeom prst="straightConnector1">
-            <a:avLst/>
-          </a:prstGeom>
-          <a:ln w="19050">
-            <a:solidFill>
-              <a:srgbClr val="0070C0"/>
-            </a:solidFill>
-            <a:tailEnd type="arrow"/>
-          </a:ln>
-        </p:spPr>
-        <p:style>
-          <a:lnRef idx="1">
-            <a:schemeClr val="accent1"/>
-          </a:lnRef>
-          <a:fillRef idx="0">
-            <a:schemeClr val="accent1"/>
-          </a:fillRef>
-          <a:effectRef idx="0">
-            <a:schemeClr val="accent1"/>
-          </a:effectRef>
-          <a:fontRef idx="minor">
-            <a:schemeClr val="tx1"/>
-          </a:fontRef>
-        </p:style>
-      </p:cxnSp>
-      <p:cxnSp>
-        <p:nvCxnSpPr>
-          <p:cNvPr id="94" name="Straight Arrow Connector 93">
-            <a:extLst>
-              <a:ext uri="{FF2B5EF4-FFF2-40B4-BE49-F238E27FC236}">
-                <a16:creationId xmlns:a16="http://schemas.microsoft.com/office/drawing/2014/main" id="{12305FAF-7B7B-45AA-8612-E8F1BC9E9C88}"/>
-              </a:ext>
-            </a:extLst>
-          </p:cNvPr>
-          <p:cNvCxnSpPr>
-            <a:cxnSpLocks/>
-            <a:endCxn id="101" idx="2"/>
-          </p:cNvCxnSpPr>
-          <p:nvPr/>
-        </p:nvCxnSpPr>
-        <p:spPr>
-          <a:xfrm>
-            <a:off x="6582043" y="7286339"/>
-            <a:ext cx="5030988" cy="10792"/>
-          </a:xfrm>
-          <a:prstGeom prst="straightConnector1">
-            <a:avLst/>
-          </a:prstGeom>
-          <a:ln w="19050">
-            <a:solidFill>
-              <a:schemeClr val="accent3">
-                <a:lumMod val="60000"/>
-                <a:lumOff val="40000"/>
-              </a:schemeClr>
-            </a:solidFill>
-            <a:prstDash val="sysDash"/>
-            <a:headEnd type="arrow" w="med" len="med"/>
-            <a:tailEnd type="none" w="med" len="med"/>
-          </a:ln>
-        </p:spPr>
-        <p:style>
-          <a:lnRef idx="1">
-            <a:schemeClr val="accent1"/>
-          </a:lnRef>
-          <a:fillRef idx="0">
-            <a:schemeClr val="accent1"/>
-          </a:fillRef>
-          <a:effectRef idx="0">
-            <a:schemeClr val="accent1"/>
-          </a:effectRef>
-          <a:fontRef idx="minor">
-            <a:schemeClr val="tx1"/>
-          </a:fontRef>
-        </p:style>
-      </p:cxnSp>
-      <p:sp>
-        <p:nvSpPr>
-          <p:cNvPr id="95" name="TextBox 94">
-            <a:extLst>
-              <a:ext uri="{FF2B5EF4-FFF2-40B4-BE49-F238E27FC236}">
-                <a16:creationId xmlns:a16="http://schemas.microsoft.com/office/drawing/2014/main" id="{8239EE9B-89FC-4BAC-9BB2-29003EE3D676}"/>
+                <a16:creationId xmlns:a16="http://schemas.microsoft.com/office/drawing/2014/main" id="{342C772C-49B9-4A7C-954C-0A60F7E4D4AE}"/>
               </a:ext>
             </a:extLst>
           </p:cNvPr>
@@ -5846,8 +5260,8 @@
         </p:nvSpPr>
         <p:spPr>
           <a:xfrm>
-            <a:off x="7044717" y="6874356"/>
-            <a:ext cx="2011237" cy="184666"/>
+            <a:off x="7009301" y="4438489"/>
+            <a:ext cx="142051" cy="141089"/>
           </a:xfrm>
           <a:prstGeom prst="rect">
             <a:avLst/>
@@ -5871,90 +5285,20 @@
             </a:lvl1pPr>
           </a:lstStyle>
           <a:p>
-            <a:r>
-              <a:rPr lang="en-US" sz="1200" dirty="0">
-                <a:solidFill>
-                  <a:schemeClr val="accent3">
-                    <a:lumMod val="75000"/>
-                  </a:schemeClr>
-                </a:solidFill>
-              </a:rPr>
-              <a:t>Post(e)</a:t>
-            </a:r>
-          </a:p>
-        </p:txBody>
-      </p:sp>
-      <p:sp>
-        <p:nvSpPr>
-          <p:cNvPr id="101" name="Rectangle 100">
+            <a:pPr algn="l"/>
+            <a:r>
+              <a:rPr lang="en-US" sz="900" dirty="0"/>
+              <a:t>c</a:t>
+            </a:r>
+          </a:p>
+        </p:txBody>
+      </p:sp>
+      <p:sp>
+        <p:nvSpPr>
+          <p:cNvPr id="103" name="TextBox 102">
             <a:extLst>
               <a:ext uri="{FF2B5EF4-FFF2-40B4-BE49-F238E27FC236}">
-                <a16:creationId xmlns:a16="http://schemas.microsoft.com/office/drawing/2014/main" id="{B07A1F6A-7953-4A12-93D5-7B31A4E4AA19}"/>
-              </a:ext>
-            </a:extLst>
-          </p:cNvPr>
-          <p:cNvSpPr/>
-          <p:nvPr/>
-        </p:nvSpPr>
-        <p:spPr>
-          <a:xfrm>
-            <a:off x="11536831" y="7097328"/>
-            <a:ext cx="152400" cy="199803"/>
-          </a:xfrm>
-          <a:prstGeom prst="rect">
-            <a:avLst/>
-          </a:prstGeom>
-          <a:solidFill>
-            <a:schemeClr val="accent3">
-              <a:lumMod val="60000"/>
-              <a:lumOff val="40000"/>
-            </a:schemeClr>
-          </a:solidFill>
-          <a:ln>
-            <a:solidFill>
-              <a:schemeClr val="accent3">
-                <a:lumMod val="60000"/>
-                <a:lumOff val="40000"/>
-              </a:schemeClr>
-            </a:solidFill>
-          </a:ln>
-          <a:effectLst/>
-        </p:spPr>
-        <p:style>
-          <a:lnRef idx="1">
-            <a:schemeClr val="accent3"/>
-          </a:lnRef>
-          <a:fillRef idx="2">
-            <a:schemeClr val="accent3"/>
-          </a:fillRef>
-          <a:effectRef idx="1">
-            <a:schemeClr val="accent3"/>
-          </a:effectRef>
-          <a:fontRef idx="minor">
-            <a:schemeClr val="dk1"/>
-          </a:fontRef>
-        </p:style>
-        <p:txBody>
-          <a:bodyPr rtlCol="0" anchor="ctr"/>
-          <a:lstStyle/>
-          <a:p>
-            <a:pPr algn="ctr"/>
-            <a:endParaRPr lang="en-SG" sz="1400">
-              <a:solidFill>
-                <a:schemeClr val="accent3">
-                  <a:lumMod val="75000"/>
-                </a:schemeClr>
-              </a:solidFill>
-            </a:endParaRPr>
-          </a:p>
-        </p:txBody>
-      </p:sp>
-      <p:sp>
-        <p:nvSpPr>
-          <p:cNvPr id="93" name="TextBox 92">
-            <a:extLst>
-              <a:ext uri="{FF2B5EF4-FFF2-40B4-BE49-F238E27FC236}">
-                <a16:creationId xmlns:a16="http://schemas.microsoft.com/office/drawing/2014/main" id="{342C772C-49B9-4A7C-954C-0A60F7E4D4AE}"/>
+                <a16:creationId xmlns:a16="http://schemas.microsoft.com/office/drawing/2014/main" id="{CF48C778-CDF0-4E98-B24B-E5A465D3B835}"/>
               </a:ext>
             </a:extLst>
           </p:cNvPr>
@@ -5963,8 +5307,8 @@
         </p:nvSpPr>
         <p:spPr>
           <a:xfrm>
-            <a:off x="5512392" y="3574385"/>
-            <a:ext cx="142051" cy="141089"/>
+            <a:off x="3374650" y="4539758"/>
+            <a:ext cx="171666" cy="138499"/>
           </a:xfrm>
           <a:prstGeom prst="rect">
             <a:avLst/>
@@ -5998,10 +5342,10 @@
       </p:sp>
       <p:sp>
         <p:nvSpPr>
-          <p:cNvPr id="98" name="TextBox 97">
+          <p:cNvPr id="104" name="TextBox 103">
             <a:extLst>
               <a:ext uri="{FF2B5EF4-FFF2-40B4-BE49-F238E27FC236}">
-                <a16:creationId xmlns:a16="http://schemas.microsoft.com/office/drawing/2014/main" id="{6FD68786-5FE9-4D43-8AB2-7671AE5568F6}"/>
+                <a16:creationId xmlns:a16="http://schemas.microsoft.com/office/drawing/2014/main" id="{88729FE3-2A1B-49D9-B9F6-1B14157567C7}"/>
               </a:ext>
             </a:extLst>
           </p:cNvPr>
@@ -6010,7 +5354,7 @@
         </p:nvSpPr>
         <p:spPr>
           <a:xfrm>
-            <a:off x="5403314" y="2893219"/>
+            <a:off x="2075264" y="3983493"/>
             <a:ext cx="142109" cy="138499"/>
           </a:xfrm>
           <a:prstGeom prst="rect">
@@ -6045,10 +5389,10 @@
       </p:sp>
       <p:sp>
         <p:nvSpPr>
-          <p:cNvPr id="99" name="TextBox 98">
+          <p:cNvPr id="107" name="TextBox 106">
             <a:extLst>
               <a:ext uri="{FF2B5EF4-FFF2-40B4-BE49-F238E27FC236}">
-                <a16:creationId xmlns:a16="http://schemas.microsoft.com/office/drawing/2014/main" id="{4D2E9123-8C25-4455-B725-F655ADF7661E}"/>
+                <a16:creationId xmlns:a16="http://schemas.microsoft.com/office/drawing/2014/main" id="{F9AE80AE-113A-4C0B-968F-7F5321DA87DA}"/>
               </a:ext>
             </a:extLst>
           </p:cNvPr>
@@ -6057,8 +5401,47 @@
         </p:nvSpPr>
         <p:spPr>
           <a:xfrm>
-            <a:off x="3805510" y="2964802"/>
-            <a:ext cx="142109" cy="138499"/>
+            <a:off x="2856280" y="4245024"/>
+            <a:ext cx="258404" cy="261610"/>
+          </a:xfrm>
+          <a:prstGeom prst="rect">
+            <a:avLst/>
+          </a:prstGeom>
+          <a:noFill/>
+        </p:spPr>
+        <p:txBody>
+          <a:bodyPr wrap="none" rtlCol="0">
+            <a:spAutoFit/>
+          </a:bodyPr>
+          <a:lstStyle/>
+          <a:p>
+            <a:r>
+              <a:rPr lang="en-SG" sz="1100" dirty="0">
+                <a:solidFill>
+                  <a:srgbClr val="002060"/>
+                </a:solidFill>
+              </a:rPr>
+              <a:t>X</a:t>
+            </a:r>
+          </a:p>
+        </p:txBody>
+      </p:sp>
+      <p:sp>
+        <p:nvSpPr>
+          <p:cNvPr id="119" name="TextBox 118">
+            <a:extLst>
+              <a:ext uri="{FF2B5EF4-FFF2-40B4-BE49-F238E27FC236}">
+                <a16:creationId xmlns:a16="http://schemas.microsoft.com/office/drawing/2014/main" id="{5049776C-77E5-44EC-B7C2-BC9DF6ED4C69}"/>
+              </a:ext>
+            </a:extLst>
+          </p:cNvPr>
+          <p:cNvSpPr txBox="1"/>
+          <p:nvPr/>
+        </p:nvSpPr>
+        <p:spPr>
+          <a:xfrm>
+            <a:off x="9356795" y="6088243"/>
+            <a:ext cx="1817235" cy="138499"/>
           </a:xfrm>
           <a:prstGeom prst="rect">
             <a:avLst/>
@@ -6084,18 +5467,249 @@
           <a:p>
             <a:pPr algn="l"/>
             <a:r>
-              <a:rPr lang="en-US" sz="900" dirty="0"/>
-              <a:t>c</a:t>
-            </a:r>
-          </a:p>
-        </p:txBody>
-      </p:sp>
-      <p:sp>
-        <p:nvSpPr>
-          <p:cNvPr id="103" name="TextBox 102">
+              <a:rPr lang="en-US" sz="900" dirty="0" err="1">
+                <a:solidFill>
+                  <a:srgbClr val="7030A0"/>
+                </a:solidFill>
+              </a:rPr>
+              <a:t>isSuccessful</a:t>
+            </a:r>
+            <a:endParaRPr lang="en-US" sz="900" dirty="0">
+              <a:solidFill>
+                <a:srgbClr val="7030A0"/>
+              </a:solidFill>
+            </a:endParaRPr>
+          </a:p>
+        </p:txBody>
+      </p:sp>
+      <p:sp>
+        <p:nvSpPr>
+          <p:cNvPr id="124" name="Rectangle 62">
             <a:extLst>
               <a:ext uri="{FF2B5EF4-FFF2-40B4-BE49-F238E27FC236}">
-                <a16:creationId xmlns:a16="http://schemas.microsoft.com/office/drawing/2014/main" id="{CF48C778-CDF0-4E98-B24B-E5A465D3B835}"/>
+                <a16:creationId xmlns:a16="http://schemas.microsoft.com/office/drawing/2014/main" id="{3CFF3699-EA1C-4222-AD53-3F9278C29507}"/>
+              </a:ext>
+            </a:extLst>
+          </p:cNvPr>
+          <p:cNvSpPr/>
+          <p:nvPr/>
+        </p:nvSpPr>
+        <p:spPr>
+          <a:xfrm>
+            <a:off x="6148354" y="2679246"/>
+            <a:ext cx="1124703" cy="775745"/>
+          </a:xfrm>
+          <a:prstGeom prst="rect">
+            <a:avLst/>
+          </a:prstGeom>
+          <a:solidFill>
+            <a:srgbClr val="0070C0"/>
+          </a:solidFill>
+          <a:ln w="19050">
+            <a:solidFill>
+              <a:srgbClr val="0070C0"/>
+            </a:solidFill>
+          </a:ln>
+          <a:effectLst/>
+        </p:spPr>
+        <p:style>
+          <a:lnRef idx="1">
+            <a:schemeClr val="accent2"/>
+          </a:lnRef>
+          <a:fillRef idx="2">
+            <a:schemeClr val="accent2"/>
+          </a:fillRef>
+          <a:effectRef idx="1">
+            <a:schemeClr val="accent2"/>
+          </a:effectRef>
+          <a:fontRef idx="minor">
+            <a:schemeClr val="dk1"/>
+          </a:fontRef>
+        </p:style>
+        <p:txBody>
+          <a:bodyPr rtlCol="0" anchor="ctr"/>
+          <a:lstStyle/>
+          <a:p>
+            <a:pPr algn="ctr"/>
+            <a:r>
+              <a:rPr lang="en-US" sz="1600" dirty="0" err="1">
+                <a:solidFill>
+                  <a:schemeClr val="bg1"/>
+                </a:solidFill>
+              </a:rPr>
+              <a:t>credentials:Login</a:t>
+            </a:r>
+            <a:endParaRPr lang="en-US" sz="1600" dirty="0">
+              <a:solidFill>
+                <a:schemeClr val="bg1"/>
+              </a:solidFill>
+            </a:endParaRPr>
+          </a:p>
+          <a:p>
+            <a:pPr algn="ctr"/>
+            <a:r>
+              <a:rPr lang="en-US" sz="1600" dirty="0">
+                <a:solidFill>
+                  <a:schemeClr val="bg1"/>
+                </a:solidFill>
+              </a:rPr>
+              <a:t>Credentials</a:t>
+            </a:r>
+            <a:endParaRPr lang="en-SG" sz="1600" dirty="0">
+              <a:solidFill>
+                <a:schemeClr val="bg1"/>
+              </a:solidFill>
+            </a:endParaRPr>
+          </a:p>
+        </p:txBody>
+      </p:sp>
+      <p:cxnSp>
+        <p:nvCxnSpPr>
+          <p:cNvPr id="125" name="Straight Connector 124">
+            <a:extLst>
+              <a:ext uri="{FF2B5EF4-FFF2-40B4-BE49-F238E27FC236}">
+                <a16:creationId xmlns:a16="http://schemas.microsoft.com/office/drawing/2014/main" id="{E4756815-21B4-48E2-9641-2EAF61502FA4}"/>
+              </a:ext>
+            </a:extLst>
+          </p:cNvPr>
+          <p:cNvCxnSpPr>
+            <a:cxnSpLocks/>
+            <a:stCxn id="126" idx="0"/>
+          </p:cNvCxnSpPr>
+          <p:nvPr/>
+        </p:nvCxnSpPr>
+        <p:spPr>
+          <a:xfrm flipH="1">
+            <a:off x="6670395" y="3452428"/>
+            <a:ext cx="30703" cy="4461082"/>
+          </a:xfrm>
+          <a:prstGeom prst="line">
+            <a:avLst/>
+          </a:prstGeom>
+          <a:ln w="19050">
+            <a:solidFill>
+              <a:srgbClr val="0070C0"/>
+            </a:solidFill>
+            <a:prstDash val="sysDash"/>
+          </a:ln>
+          <a:effectLst/>
+        </p:spPr>
+        <p:style>
+          <a:lnRef idx="1">
+            <a:schemeClr val="accent1"/>
+          </a:lnRef>
+          <a:fillRef idx="2">
+            <a:schemeClr val="accent1"/>
+          </a:fillRef>
+          <a:effectRef idx="1">
+            <a:schemeClr val="accent1"/>
+          </a:effectRef>
+          <a:fontRef idx="minor">
+            <a:schemeClr val="dk1"/>
+          </a:fontRef>
+        </p:style>
+      </p:cxnSp>
+      <p:sp>
+        <p:nvSpPr>
+          <p:cNvPr id="126" name="Rectangle 125">
+            <a:extLst>
+              <a:ext uri="{FF2B5EF4-FFF2-40B4-BE49-F238E27FC236}">
+                <a16:creationId xmlns:a16="http://schemas.microsoft.com/office/drawing/2014/main" id="{80A9F6DD-CBCA-4260-9F93-872591206960}"/>
+              </a:ext>
+            </a:extLst>
+          </p:cNvPr>
+          <p:cNvSpPr/>
+          <p:nvPr/>
+        </p:nvSpPr>
+        <p:spPr>
+          <a:xfrm>
+            <a:off x="6620285" y="3452428"/>
+            <a:ext cx="161626" cy="212934"/>
+          </a:xfrm>
+          <a:prstGeom prst="rect">
+            <a:avLst/>
+          </a:prstGeom>
+          <a:solidFill>
+            <a:srgbClr val="0070C0"/>
+          </a:solidFill>
+          <a:ln>
+            <a:solidFill>
+              <a:srgbClr val="0070C0"/>
+            </a:solidFill>
+          </a:ln>
+          <a:effectLst/>
+        </p:spPr>
+        <p:style>
+          <a:lnRef idx="1">
+            <a:schemeClr val="accent3"/>
+          </a:lnRef>
+          <a:fillRef idx="2">
+            <a:schemeClr val="accent3"/>
+          </a:fillRef>
+          <a:effectRef idx="1">
+            <a:schemeClr val="accent3"/>
+          </a:effectRef>
+          <a:fontRef idx="minor">
+            <a:schemeClr val="dk1"/>
+          </a:fontRef>
+        </p:style>
+        <p:txBody>
+          <a:bodyPr rtlCol="0" anchor="ctr"/>
+          <a:lstStyle/>
+          <a:p>
+            <a:pPr algn="ctr"/>
+            <a:endParaRPr lang="en-SG" sz="1400"/>
+          </a:p>
+        </p:txBody>
+      </p:sp>
+      <p:cxnSp>
+        <p:nvCxnSpPr>
+          <p:cNvPr id="127" name="Straight Arrow Connector 126">
+            <a:extLst>
+              <a:ext uri="{FF2B5EF4-FFF2-40B4-BE49-F238E27FC236}">
+                <a16:creationId xmlns:a16="http://schemas.microsoft.com/office/drawing/2014/main" id="{FFF73383-46DE-4BE0-91B6-24925FC39819}"/>
+              </a:ext>
+            </a:extLst>
+          </p:cNvPr>
+          <p:cNvCxnSpPr>
+            <a:cxnSpLocks/>
+          </p:cNvCxnSpPr>
+          <p:nvPr/>
+        </p:nvCxnSpPr>
+        <p:spPr>
+          <a:xfrm>
+            <a:off x="4840061" y="2667000"/>
+            <a:ext cx="1308441" cy="0"/>
+          </a:xfrm>
+          <a:prstGeom prst="straightConnector1">
+            <a:avLst/>
+          </a:prstGeom>
+          <a:ln w="19050">
+            <a:headEnd type="none" w="med" len="med"/>
+            <a:tailEnd type="arrow" w="med" len="med"/>
+          </a:ln>
+        </p:spPr>
+        <p:style>
+          <a:lnRef idx="1">
+            <a:schemeClr val="accent1"/>
+          </a:lnRef>
+          <a:fillRef idx="0">
+            <a:schemeClr val="accent1"/>
+          </a:fillRef>
+          <a:effectRef idx="0">
+            <a:schemeClr val="accent1"/>
+          </a:effectRef>
+          <a:fontRef idx="minor">
+            <a:schemeClr val="tx1"/>
+          </a:fontRef>
+        </p:style>
+      </p:cxnSp>
+      <p:sp>
+        <p:nvSpPr>
+          <p:cNvPr id="130" name="TextBox 129">
+            <a:extLst>
+              <a:ext uri="{FF2B5EF4-FFF2-40B4-BE49-F238E27FC236}">
+                <a16:creationId xmlns:a16="http://schemas.microsoft.com/office/drawing/2014/main" id="{5DCCA3FF-AE36-4272-B24C-979EBA877C59}"/>
               </a:ext>
             </a:extLst>
           </p:cNvPr>
@@ -6104,8 +5718,132 @@
         </p:nvSpPr>
         <p:spPr>
           <a:xfrm>
-            <a:off x="3776852" y="3510216"/>
-            <a:ext cx="171666" cy="138499"/>
+            <a:off x="6541193" y="7913510"/>
+            <a:ext cx="258404" cy="261610"/>
+          </a:xfrm>
+          <a:prstGeom prst="rect">
+            <a:avLst/>
+          </a:prstGeom>
+          <a:noFill/>
+        </p:spPr>
+        <p:txBody>
+          <a:bodyPr wrap="none" rtlCol="0">
+            <a:spAutoFit/>
+          </a:bodyPr>
+          <a:lstStyle/>
+          <a:p>
+            <a:r>
+              <a:rPr lang="en-SG" sz="1100" dirty="0">
+                <a:solidFill>
+                  <a:srgbClr val="002060"/>
+                </a:solidFill>
+              </a:rPr>
+              <a:t>X</a:t>
+            </a:r>
+          </a:p>
+        </p:txBody>
+      </p:sp>
+      <p:sp>
+        <p:nvSpPr>
+          <p:cNvPr id="131" name="TextBox 130">
+            <a:extLst>
+              <a:ext uri="{FF2B5EF4-FFF2-40B4-BE49-F238E27FC236}">
+                <a16:creationId xmlns:a16="http://schemas.microsoft.com/office/drawing/2014/main" id="{23C2394C-C9B5-4E84-8B50-8226D40BA3F6}"/>
+              </a:ext>
+            </a:extLst>
+          </p:cNvPr>
+          <p:cNvSpPr txBox="1"/>
+          <p:nvPr/>
+        </p:nvSpPr>
+        <p:spPr>
+          <a:xfrm>
+            <a:off x="8492480" y="7836817"/>
+            <a:ext cx="258404" cy="261610"/>
+          </a:xfrm>
+          <a:prstGeom prst="rect">
+            <a:avLst/>
+          </a:prstGeom>
+          <a:noFill/>
+        </p:spPr>
+        <p:txBody>
+          <a:bodyPr wrap="none" rtlCol="0">
+            <a:spAutoFit/>
+          </a:bodyPr>
+          <a:lstStyle/>
+          <a:p>
+            <a:r>
+              <a:rPr lang="en-SG" sz="1100" dirty="0">
+                <a:solidFill>
+                  <a:srgbClr val="002060"/>
+                </a:solidFill>
+              </a:rPr>
+              <a:t>X</a:t>
+            </a:r>
+          </a:p>
+        </p:txBody>
+      </p:sp>
+      <p:cxnSp>
+        <p:nvCxnSpPr>
+          <p:cNvPr id="132" name="Straight Arrow Connector 131">
+            <a:extLst>
+              <a:ext uri="{FF2B5EF4-FFF2-40B4-BE49-F238E27FC236}">
+                <a16:creationId xmlns:a16="http://schemas.microsoft.com/office/drawing/2014/main" id="{8283819E-9A42-4E12-BE58-16C9F3BC2768}"/>
+              </a:ext>
+            </a:extLst>
+          </p:cNvPr>
+          <p:cNvCxnSpPr>
+            <a:cxnSpLocks/>
+          </p:cNvCxnSpPr>
+          <p:nvPr/>
+        </p:nvCxnSpPr>
+        <p:spPr>
+          <a:xfrm>
+            <a:off x="1290261" y="7243725"/>
+            <a:ext cx="7342200" cy="0"/>
+          </a:xfrm>
+          <a:prstGeom prst="straightConnector1">
+            <a:avLst/>
+          </a:prstGeom>
+          <a:ln w="19050">
+            <a:solidFill>
+              <a:srgbClr val="0070C0"/>
+            </a:solidFill>
+            <a:prstDash val="sysDash"/>
+            <a:headEnd type="arrow" w="med" len="med"/>
+            <a:tailEnd type="none" w="med" len="med"/>
+          </a:ln>
+        </p:spPr>
+        <p:style>
+          <a:lnRef idx="1">
+            <a:schemeClr val="accent1"/>
+          </a:lnRef>
+          <a:fillRef idx="0">
+            <a:schemeClr val="accent1"/>
+          </a:fillRef>
+          <a:effectRef idx="0">
+            <a:schemeClr val="accent1"/>
+          </a:effectRef>
+          <a:fontRef idx="minor">
+            <a:schemeClr val="tx1"/>
+          </a:fontRef>
+        </p:style>
+      </p:cxnSp>
+      <p:sp>
+        <p:nvSpPr>
+          <p:cNvPr id="133" name="TextBox 132">
+            <a:extLst>
+              <a:ext uri="{FF2B5EF4-FFF2-40B4-BE49-F238E27FC236}">
+                <a16:creationId xmlns:a16="http://schemas.microsoft.com/office/drawing/2014/main" id="{0C6E30CF-96FC-4F87-ACB9-E3E7DDCA6E0C}"/>
+              </a:ext>
+            </a:extLst>
+          </p:cNvPr>
+          <p:cNvSpPr txBox="1"/>
+          <p:nvPr/>
+        </p:nvSpPr>
+        <p:spPr>
+          <a:xfrm>
+            <a:off x="5507200" y="6999594"/>
+            <a:ext cx="621216" cy="215444"/>
           </a:xfrm>
           <a:prstGeom prst="rect">
             <a:avLst/>
@@ -6129,20 +5867,277 @@
             </a:lvl1pPr>
           </a:lstStyle>
           <a:p>
-            <a:pPr algn="l"/>
-            <a:r>
-              <a:rPr lang="en-US" sz="900" dirty="0"/>
-              <a:t>c</a:t>
-            </a:r>
-          </a:p>
-        </p:txBody>
-      </p:sp>
-      <p:sp>
-        <p:nvSpPr>
-          <p:cNvPr id="104" name="TextBox 103">
+            <a:r>
+              <a:rPr lang="en-US" dirty="0"/>
+              <a:t>result</a:t>
+            </a:r>
+          </a:p>
+        </p:txBody>
+      </p:sp>
+      <p:sp>
+        <p:nvSpPr>
+          <p:cNvPr id="134" name="Rectangle 62">
             <a:extLst>
               <a:ext uri="{FF2B5EF4-FFF2-40B4-BE49-F238E27FC236}">
-                <a16:creationId xmlns:a16="http://schemas.microsoft.com/office/drawing/2014/main" id="{88729FE3-2A1B-49D9-B9F6-1B14157567C7}"/>
+                <a16:creationId xmlns:a16="http://schemas.microsoft.com/office/drawing/2014/main" id="{A2BE20A7-E51B-4083-B097-8ABA43D63BF4}"/>
+              </a:ext>
+            </a:extLst>
+          </p:cNvPr>
+          <p:cNvSpPr/>
+          <p:nvPr/>
+        </p:nvSpPr>
+        <p:spPr>
+          <a:xfrm>
+            <a:off x="8861141" y="6527631"/>
+            <a:ext cx="1590354" cy="461538"/>
+          </a:xfrm>
+          <a:prstGeom prst="rect">
+            <a:avLst/>
+          </a:prstGeom>
+          <a:solidFill>
+            <a:srgbClr val="0070C0"/>
+          </a:solidFill>
+          <a:ln w="19050">
+            <a:solidFill>
+              <a:srgbClr val="0070C0"/>
+            </a:solidFill>
+          </a:ln>
+          <a:effectLst/>
+        </p:spPr>
+        <p:style>
+          <a:lnRef idx="1">
+            <a:schemeClr val="accent2"/>
+          </a:lnRef>
+          <a:fillRef idx="2">
+            <a:schemeClr val="accent2"/>
+          </a:fillRef>
+          <a:effectRef idx="1">
+            <a:schemeClr val="accent2"/>
+          </a:effectRef>
+          <a:fontRef idx="minor">
+            <a:schemeClr val="dk1"/>
+          </a:fontRef>
+        </p:style>
+        <p:txBody>
+          <a:bodyPr rtlCol="0" anchor="ctr"/>
+          <a:lstStyle/>
+          <a:p>
+            <a:pPr algn="ctr"/>
+            <a:r>
+              <a:rPr lang="en-US" sz="1600" dirty="0" err="1">
+                <a:solidFill>
+                  <a:schemeClr val="bg1"/>
+                </a:solidFill>
+              </a:rPr>
+              <a:t>result:Command</a:t>
+            </a:r>
+            <a:r>
+              <a:rPr lang="en-US" sz="1600" dirty="0">
+                <a:solidFill>
+                  <a:schemeClr val="bg1"/>
+                </a:solidFill>
+              </a:rPr>
+              <a:t> Result</a:t>
+            </a:r>
+            <a:endParaRPr lang="en-SG" sz="1600" dirty="0">
+              <a:solidFill>
+                <a:schemeClr val="bg1"/>
+              </a:solidFill>
+            </a:endParaRPr>
+          </a:p>
+        </p:txBody>
+      </p:sp>
+      <p:sp>
+        <p:nvSpPr>
+          <p:cNvPr id="135" name="Rectangle 134">
+            <a:extLst>
+              <a:ext uri="{FF2B5EF4-FFF2-40B4-BE49-F238E27FC236}">
+                <a16:creationId xmlns:a16="http://schemas.microsoft.com/office/drawing/2014/main" id="{3EBC0EFB-6ECF-426F-B9DC-551B8E548BBF}"/>
+              </a:ext>
+            </a:extLst>
+          </p:cNvPr>
+          <p:cNvSpPr/>
+          <p:nvPr/>
+        </p:nvSpPr>
+        <p:spPr>
+          <a:xfrm>
+            <a:off x="9588078" y="6989169"/>
+            <a:ext cx="152400" cy="171376"/>
+          </a:xfrm>
+          <a:prstGeom prst="rect">
+            <a:avLst/>
+          </a:prstGeom>
+          <a:solidFill>
+            <a:srgbClr val="0070C0"/>
+          </a:solidFill>
+          <a:ln>
+            <a:solidFill>
+              <a:srgbClr val="0070C0"/>
+            </a:solidFill>
+          </a:ln>
+          <a:effectLst/>
+        </p:spPr>
+        <p:style>
+          <a:lnRef idx="1">
+            <a:schemeClr val="accent3"/>
+          </a:lnRef>
+          <a:fillRef idx="2">
+            <a:schemeClr val="accent3"/>
+          </a:fillRef>
+          <a:effectRef idx="1">
+            <a:schemeClr val="accent3"/>
+          </a:effectRef>
+          <a:fontRef idx="minor">
+            <a:schemeClr val="dk1"/>
+          </a:fontRef>
+        </p:style>
+        <p:txBody>
+          <a:bodyPr rtlCol="0" anchor="ctr"/>
+          <a:lstStyle/>
+          <a:p>
+            <a:pPr algn="ctr"/>
+            <a:endParaRPr lang="en-SG" sz="1400"/>
+          </a:p>
+        </p:txBody>
+      </p:sp>
+      <p:cxnSp>
+        <p:nvCxnSpPr>
+          <p:cNvPr id="136" name="Straight Arrow Connector 135">
+            <a:extLst>
+              <a:ext uri="{FF2B5EF4-FFF2-40B4-BE49-F238E27FC236}">
+                <a16:creationId xmlns:a16="http://schemas.microsoft.com/office/drawing/2014/main" id="{48EE5D5D-A838-45F9-A7D7-718654B6FF40}"/>
+              </a:ext>
+            </a:extLst>
+          </p:cNvPr>
+          <p:cNvCxnSpPr/>
+          <p:nvPr/>
+        </p:nvCxnSpPr>
+        <p:spPr>
+          <a:xfrm>
+            <a:off x="8698895" y="7160545"/>
+            <a:ext cx="966624" cy="0"/>
+          </a:xfrm>
+          <a:prstGeom prst="straightConnector1">
+            <a:avLst/>
+          </a:prstGeom>
+          <a:ln w="19050">
+            <a:solidFill>
+              <a:srgbClr val="0070C0"/>
+            </a:solidFill>
+            <a:prstDash val="sysDash"/>
+            <a:headEnd type="arrow" w="med" len="med"/>
+            <a:tailEnd type="none" w="med" len="med"/>
+          </a:ln>
+        </p:spPr>
+        <p:style>
+          <a:lnRef idx="1">
+            <a:schemeClr val="accent1"/>
+          </a:lnRef>
+          <a:fillRef idx="0">
+            <a:schemeClr val="accent1"/>
+          </a:fillRef>
+          <a:effectRef idx="0">
+            <a:schemeClr val="accent1"/>
+          </a:effectRef>
+          <a:fontRef idx="minor">
+            <a:schemeClr val="tx1"/>
+          </a:fontRef>
+        </p:style>
+      </p:cxnSp>
+      <p:cxnSp>
+        <p:nvCxnSpPr>
+          <p:cNvPr id="137" name="Straight Arrow Connector 136">
+            <a:extLst>
+              <a:ext uri="{FF2B5EF4-FFF2-40B4-BE49-F238E27FC236}">
+                <a16:creationId xmlns:a16="http://schemas.microsoft.com/office/drawing/2014/main" id="{EF50694E-2342-4D24-8E71-2F0367D48506}"/>
+              </a:ext>
+            </a:extLst>
+          </p:cNvPr>
+          <p:cNvCxnSpPr>
+            <a:cxnSpLocks/>
+          </p:cNvCxnSpPr>
+          <p:nvPr/>
+        </p:nvCxnSpPr>
+        <p:spPr>
+          <a:xfrm>
+            <a:off x="8717188" y="6527631"/>
+            <a:ext cx="162246" cy="0"/>
+          </a:xfrm>
+          <a:prstGeom prst="straightConnector1">
+            <a:avLst/>
+          </a:prstGeom>
+          <a:ln w="19050">
+            <a:headEnd type="none" w="med" len="med"/>
+            <a:tailEnd type="arrow" w="med" len="med"/>
+          </a:ln>
+        </p:spPr>
+        <p:style>
+          <a:lnRef idx="1">
+            <a:schemeClr val="accent1"/>
+          </a:lnRef>
+          <a:fillRef idx="0">
+            <a:schemeClr val="accent1"/>
+          </a:fillRef>
+          <a:effectRef idx="0">
+            <a:schemeClr val="accent1"/>
+          </a:effectRef>
+          <a:fontRef idx="minor">
+            <a:schemeClr val="tx1"/>
+          </a:fontRef>
+        </p:style>
+      </p:cxnSp>
+      <p:cxnSp>
+        <p:nvCxnSpPr>
+          <p:cNvPr id="143" name="Straight Connector 142">
+            <a:extLst>
+              <a:ext uri="{FF2B5EF4-FFF2-40B4-BE49-F238E27FC236}">
+                <a16:creationId xmlns:a16="http://schemas.microsoft.com/office/drawing/2014/main" id="{F5554736-0864-46DF-A4BE-A8E8964FEABE}"/>
+              </a:ext>
+            </a:extLst>
+          </p:cNvPr>
+          <p:cNvCxnSpPr>
+            <a:cxnSpLocks/>
+            <a:stCxn id="134" idx="2"/>
+          </p:cNvCxnSpPr>
+          <p:nvPr/>
+        </p:nvCxnSpPr>
+        <p:spPr>
+          <a:xfrm>
+            <a:off x="9656318" y="6989169"/>
+            <a:ext cx="0" cy="1240431"/>
+          </a:xfrm>
+          <a:prstGeom prst="line">
+            <a:avLst/>
+          </a:prstGeom>
+          <a:ln w="19050">
+            <a:solidFill>
+              <a:srgbClr val="0070C0"/>
+            </a:solidFill>
+            <a:prstDash val="sysDash"/>
+          </a:ln>
+          <a:effectLst/>
+        </p:spPr>
+        <p:style>
+          <a:lnRef idx="1">
+            <a:schemeClr val="accent1"/>
+          </a:lnRef>
+          <a:fillRef idx="2">
+            <a:schemeClr val="accent1"/>
+          </a:fillRef>
+          <a:effectRef idx="1">
+            <a:schemeClr val="accent1"/>
+          </a:effectRef>
+          <a:fontRef idx="minor">
+            <a:schemeClr val="dk1"/>
+          </a:fontRef>
+        </p:style>
+      </p:cxnSp>
+      <p:sp>
+        <p:nvSpPr>
+          <p:cNvPr id="152" name="TextBox 151">
+            <a:extLst>
+              <a:ext uri="{FF2B5EF4-FFF2-40B4-BE49-F238E27FC236}">
+                <a16:creationId xmlns:a16="http://schemas.microsoft.com/office/drawing/2014/main" id="{830F197E-49DC-448D-B672-2AD0FEF6671A}"/>
               </a:ext>
             </a:extLst>
           </p:cNvPr>
@@ -6151,8 +6146,8 @@
         </p:nvSpPr>
         <p:spPr>
           <a:xfrm>
-            <a:off x="2075264" y="3983493"/>
-            <a:ext cx="142109" cy="138499"/>
+            <a:off x="8725642" y="7172064"/>
+            <a:ext cx="621216" cy="215444"/>
           </a:xfrm>
           <a:prstGeom prst="rect">
             <a:avLst/>
@@ -6176,20 +6171,19 @@
             </a:lvl1pPr>
           </a:lstStyle>
           <a:p>
-            <a:pPr algn="l"/>
-            <a:r>
-              <a:rPr lang="en-US" sz="900" dirty="0"/>
-              <a:t>c</a:t>
-            </a:r>
-          </a:p>
-        </p:txBody>
-      </p:sp>
-      <p:sp>
-        <p:nvSpPr>
-          <p:cNvPr id="107" name="TextBox 106">
+            <a:r>
+              <a:rPr lang="en-US" dirty="0"/>
+              <a:t>result</a:t>
+            </a:r>
+          </a:p>
+        </p:txBody>
+      </p:sp>
+      <p:sp>
+        <p:nvSpPr>
+          <p:cNvPr id="60" name="TextBox 59">
             <a:extLst>
               <a:ext uri="{FF2B5EF4-FFF2-40B4-BE49-F238E27FC236}">
-                <a16:creationId xmlns:a16="http://schemas.microsoft.com/office/drawing/2014/main" id="{F9AE80AE-113A-4C0B-968F-7F5321DA87DA}"/>
+                <a16:creationId xmlns:a16="http://schemas.microsoft.com/office/drawing/2014/main" id="{849D14BC-40DD-4F50-94E0-2623A1934CC1}"/>
               </a:ext>
             </a:extLst>
           </p:cNvPr>
@@ -6198,189 +6192,8 @@
         </p:nvSpPr>
         <p:spPr>
           <a:xfrm>
-            <a:off x="2856280" y="4245024"/>
-            <a:ext cx="258404" cy="261610"/>
-          </a:xfrm>
-          <a:prstGeom prst="rect">
-            <a:avLst/>
-          </a:prstGeom>
-          <a:noFill/>
-        </p:spPr>
-        <p:txBody>
-          <a:bodyPr wrap="none" rtlCol="0">
-            <a:spAutoFit/>
-          </a:bodyPr>
-          <a:lstStyle/>
-          <a:p>
-            <a:r>
-              <a:rPr lang="en-SG" sz="1100" dirty="0">
-                <a:solidFill>
-                  <a:srgbClr val="002060"/>
-                </a:solidFill>
-              </a:rPr>
-              <a:t>X</a:t>
-            </a:r>
-          </a:p>
-        </p:txBody>
-      </p:sp>
-      <p:sp>
-        <p:nvSpPr>
-          <p:cNvPr id="113" name="Rectangle 112">
-            <a:extLst>
-              <a:ext uri="{FF2B5EF4-FFF2-40B4-BE49-F238E27FC236}">
-                <a16:creationId xmlns:a16="http://schemas.microsoft.com/office/drawing/2014/main" id="{AF867ECD-09C2-49A0-BE1E-41DCCB2CA4E5}"/>
-              </a:ext>
-            </a:extLst>
-          </p:cNvPr>
-          <p:cNvSpPr/>
-          <p:nvPr/>
-        </p:nvSpPr>
-        <p:spPr>
-          <a:xfrm>
-            <a:off x="5052591" y="5824683"/>
-            <a:ext cx="7139405" cy="1789863"/>
-          </a:xfrm>
-          <a:prstGeom prst="rect">
-            <a:avLst/>
-          </a:prstGeom>
-          <a:noFill/>
-          <a:ln w="19050">
-            <a:solidFill>
-              <a:srgbClr val="FF0000"/>
-            </a:solidFill>
-          </a:ln>
-        </p:spPr>
-        <p:style>
-          <a:lnRef idx="2">
-            <a:schemeClr val="accent1">
-              <a:shade val="50000"/>
-            </a:schemeClr>
-          </a:lnRef>
-          <a:fillRef idx="1">
-            <a:schemeClr val="accent1"/>
-          </a:fillRef>
-          <a:effectRef idx="0">
-            <a:schemeClr val="accent1"/>
-          </a:effectRef>
-          <a:fontRef idx="minor">
-            <a:schemeClr val="lt1"/>
-          </a:fontRef>
-        </p:style>
-        <p:txBody>
-          <a:bodyPr rot="0" spcFirstLastPara="0" vertOverflow="overflow" horzOverflow="overflow" vert="horz" wrap="square" lIns="91440" tIns="45720" rIns="91440" bIns="45720" numCol="1" spcCol="0" rtlCol="0" fromWordArt="0" anchor="ctr" anchorCtr="0" forceAA="0" compatLnSpc="1">
-            <a:prstTxWarp prst="textNoShape">
-              <a:avLst/>
-            </a:prstTxWarp>
-            <a:noAutofit/>
-          </a:bodyPr>
-          <a:lstStyle/>
-          <a:p>
-            <a:pPr algn="ctr"/>
-            <a:endParaRPr lang="en-US"/>
-          </a:p>
-        </p:txBody>
-      </p:sp>
-      <p:pic>
-        <p:nvPicPr>
-          <p:cNvPr id="114" name="Picture 113">
-            <a:extLst>
-              <a:ext uri="{FF2B5EF4-FFF2-40B4-BE49-F238E27FC236}">
-                <a16:creationId xmlns:a16="http://schemas.microsoft.com/office/drawing/2014/main" id="{4318A044-F86A-468D-9392-E3A95F72A728}"/>
-              </a:ext>
-            </a:extLst>
-          </p:cNvPr>
-          <p:cNvPicPr>
-            <a:picLocks noChangeAspect="1"/>
-          </p:cNvPicPr>
-          <p:nvPr/>
-        </p:nvPicPr>
-        <p:blipFill>
-          <a:blip r:embed="rId2"/>
-          <a:stretch>
-            <a:fillRect/>
-          </a:stretch>
-        </p:blipFill>
-        <p:spPr>
-          <a:xfrm>
-            <a:off x="5025908" y="5783941"/>
-            <a:ext cx="365828" cy="322558"/>
-          </a:xfrm>
-          <a:prstGeom prst="rect">
-            <a:avLst/>
-          </a:prstGeom>
-        </p:spPr>
-      </p:pic>
-      <p:sp>
-        <p:nvSpPr>
-          <p:cNvPr id="116" name="TextBox 115">
-            <a:extLst>
-              <a:ext uri="{FF2B5EF4-FFF2-40B4-BE49-F238E27FC236}">
-                <a16:creationId xmlns:a16="http://schemas.microsoft.com/office/drawing/2014/main" id="{DA64EC2C-8D91-4C33-9B54-31C3576FA024}"/>
-              </a:ext>
-            </a:extLst>
-          </p:cNvPr>
-          <p:cNvSpPr txBox="1"/>
-          <p:nvPr/>
-        </p:nvSpPr>
-        <p:spPr>
-          <a:xfrm>
-            <a:off x="5351163" y="5800915"/>
-            <a:ext cx="942887" cy="261610"/>
-          </a:xfrm>
-          <a:prstGeom prst="rect">
-            <a:avLst/>
-          </a:prstGeom>
-          <a:noFill/>
-        </p:spPr>
-        <p:txBody>
-          <a:bodyPr wrap="square" rtlCol="0">
-            <a:spAutoFit/>
-          </a:bodyPr>
-          <a:lstStyle/>
-          <a:p>
-            <a:r>
-              <a:rPr lang="en-US" sz="1100" dirty="0">
-                <a:solidFill>
-                  <a:srgbClr val="FF0000"/>
-                </a:solidFill>
-              </a:rPr>
-              <a:t>[</a:t>
-            </a:r>
-            <a:r>
-              <a:rPr lang="en-US" sz="1100" dirty="0" err="1">
-                <a:solidFill>
-                  <a:srgbClr val="FF0000"/>
-                </a:solidFill>
-              </a:rPr>
-              <a:t>isSuccessful</a:t>
-            </a:r>
-            <a:r>
-              <a:rPr lang="en-US" sz="1100" dirty="0">
-                <a:solidFill>
-                  <a:srgbClr val="FF0000"/>
-                </a:solidFill>
-              </a:rPr>
-              <a:t>]</a:t>
-            </a:r>
-          </a:p>
-        </p:txBody>
-      </p:sp>
-      <p:sp>
-        <p:nvSpPr>
-          <p:cNvPr id="119" name="TextBox 118">
-            <a:extLst>
-              <a:ext uri="{FF2B5EF4-FFF2-40B4-BE49-F238E27FC236}">
-                <a16:creationId xmlns:a16="http://schemas.microsoft.com/office/drawing/2014/main" id="{5049776C-77E5-44EC-B7C2-BC9DF6ED4C69}"/>
-              </a:ext>
-            </a:extLst>
-          </p:cNvPr>
-          <p:cNvSpPr txBox="1"/>
-          <p:nvPr/>
-        </p:nvSpPr>
-        <p:spPr>
-          <a:xfrm>
-            <a:off x="7136451" y="5452655"/>
-            <a:ext cx="1817235" cy="138499"/>
+            <a:off x="2558595" y="1952655"/>
+            <a:ext cx="1042552" cy="184666"/>
           </a:xfrm>
           <a:prstGeom prst="rect">
             <a:avLst/>
@@ -6404,237 +6217,19 @@
             </a:lvl1pPr>
           </a:lstStyle>
           <a:p>
-            <a:pPr algn="l"/>
-            <a:r>
-              <a:rPr lang="en-US" sz="900" dirty="0" err="1">
-                <a:solidFill>
-                  <a:srgbClr val="7030A0"/>
-                </a:solidFill>
-              </a:rPr>
-              <a:t>isSuccessful</a:t>
-            </a:r>
-            <a:endParaRPr lang="en-US" sz="900" dirty="0">
-              <a:solidFill>
-                <a:srgbClr val="7030A0"/>
-              </a:solidFill>
-            </a:endParaRPr>
-          </a:p>
-        </p:txBody>
-      </p:sp>
-      <p:sp>
-        <p:nvSpPr>
-          <p:cNvPr id="9" name="Freeform: Shape 8">
+            <a:r>
+              <a:rPr lang="en-US" sz="1200" dirty="0"/>
+              <a:t>p</a:t>
+            </a:r>
+          </a:p>
+        </p:txBody>
+      </p:sp>
+      <p:sp>
+        <p:nvSpPr>
+          <p:cNvPr id="61" name="TextBox 60">
             <a:extLst>
               <a:ext uri="{FF2B5EF4-FFF2-40B4-BE49-F238E27FC236}">
-                <a16:creationId xmlns:a16="http://schemas.microsoft.com/office/drawing/2014/main" id="{468B5760-4C74-413D-835C-13F760AC4A3E}"/>
-              </a:ext>
-            </a:extLst>
-          </p:cNvPr>
-          <p:cNvSpPr/>
-          <p:nvPr/>
-        </p:nvSpPr>
-        <p:spPr>
-          <a:xfrm>
-            <a:off x="6478629" y="5901391"/>
-            <a:ext cx="248027" cy="123094"/>
-          </a:xfrm>
-          <a:custGeom>
-            <a:avLst/>
-            <a:gdLst>
-              <a:gd name="connsiteX0" fmla="*/ 0 w 248027"/>
-              <a:gd name="connsiteY0" fmla="*/ 41814 h 123094"/>
-              <a:gd name="connsiteX1" fmla="*/ 182880 w 248027"/>
-              <a:gd name="connsiteY1" fmla="*/ 1174 h 123094"/>
-              <a:gd name="connsiteX2" fmla="*/ 243840 w 248027"/>
-              <a:gd name="connsiteY2" fmla="*/ 82454 h 123094"/>
-              <a:gd name="connsiteX3" fmla="*/ 81280 w 248027"/>
-              <a:gd name="connsiteY3" fmla="*/ 123094 h 123094"/>
-            </a:gdLst>
-            <a:ahLst/>
-            <a:cxnLst>
-              <a:cxn ang="0">
-                <a:pos x="connsiteX0" y="connsiteY0"/>
-              </a:cxn>
-              <a:cxn ang="0">
-                <a:pos x="connsiteX1" y="connsiteY1"/>
-              </a:cxn>
-              <a:cxn ang="0">
-                <a:pos x="connsiteX2" y="connsiteY2"/>
-              </a:cxn>
-              <a:cxn ang="0">
-                <a:pos x="connsiteX3" y="connsiteY3"/>
-              </a:cxn>
-            </a:cxnLst>
-            <a:rect l="l" t="t" r="r" b="b"/>
-            <a:pathLst>
-              <a:path w="248027" h="123094">
-                <a:moveTo>
-                  <a:pt x="0" y="41814"/>
-                </a:moveTo>
-                <a:cubicBezTo>
-                  <a:pt x="71120" y="18107"/>
-                  <a:pt x="142240" y="-5599"/>
-                  <a:pt x="182880" y="1174"/>
-                </a:cubicBezTo>
-                <a:cubicBezTo>
-                  <a:pt x="223520" y="7947"/>
-                  <a:pt x="260773" y="62134"/>
-                  <a:pt x="243840" y="82454"/>
-                </a:cubicBezTo>
-                <a:cubicBezTo>
-                  <a:pt x="226907" y="102774"/>
-                  <a:pt x="125307" y="99387"/>
-                  <a:pt x="81280" y="123094"/>
-                </a:cubicBezTo>
-              </a:path>
-            </a:pathLst>
-          </a:custGeom>
-          <a:ln w="19050">
-            <a:solidFill>
-              <a:srgbClr val="0070C0"/>
-            </a:solidFill>
-            <a:tailEnd type="arrow"/>
-          </a:ln>
-        </p:spPr>
-        <p:style>
-          <a:lnRef idx="1">
-            <a:schemeClr val="accent1"/>
-          </a:lnRef>
-          <a:fillRef idx="0">
-            <a:schemeClr val="accent1"/>
-          </a:fillRef>
-          <a:effectRef idx="0">
-            <a:schemeClr val="accent1"/>
-          </a:effectRef>
-          <a:fontRef idx="minor">
-            <a:schemeClr val="tx1"/>
-          </a:fontRef>
-        </p:style>
-        <p:txBody>
-          <a:bodyPr rtlCol="0" anchor="ctr"/>
-          <a:lstStyle/>
-          <a:p>
-            <a:pPr algn="ctr"/>
-            <a:endParaRPr lang="en-SG"/>
-          </a:p>
-        </p:txBody>
-      </p:sp>
-      <p:sp>
-        <p:nvSpPr>
-          <p:cNvPr id="12" name="Freeform: Shape 11">
-            <a:extLst>
-              <a:ext uri="{FF2B5EF4-FFF2-40B4-BE49-F238E27FC236}">
-                <a16:creationId xmlns:a16="http://schemas.microsoft.com/office/drawing/2014/main" id="{F1DF5849-B050-41B5-96F3-A7098974337F}"/>
-              </a:ext>
-            </a:extLst>
-          </p:cNvPr>
-          <p:cNvSpPr/>
-          <p:nvPr/>
-        </p:nvSpPr>
-        <p:spPr>
-          <a:xfrm>
-            <a:off x="6471840" y="7343258"/>
-            <a:ext cx="220406" cy="130596"/>
-          </a:xfrm>
-          <a:custGeom>
-            <a:avLst/>
-            <a:gdLst>
-              <a:gd name="connsiteX0" fmla="*/ 85109 w 220406"/>
-              <a:gd name="connsiteY0" fmla="*/ 31775 h 130596"/>
-              <a:gd name="connsiteX1" fmla="*/ 142259 w 220406"/>
-              <a:gd name="connsiteY1" fmla="*/ 3200 h 130596"/>
-              <a:gd name="connsiteX2" fmla="*/ 218459 w 220406"/>
-              <a:gd name="connsiteY2" fmla="*/ 98450 h 130596"/>
-              <a:gd name="connsiteX3" fmla="*/ 56534 w 220406"/>
-              <a:gd name="connsiteY3" fmla="*/ 127025 h 130596"/>
-              <a:gd name="connsiteX4" fmla="*/ 8909 w 220406"/>
-              <a:gd name="connsiteY4" fmla="*/ 127025 h 130596"/>
-            </a:gdLst>
-            <a:ahLst/>
-            <a:cxnLst>
-              <a:cxn ang="0">
-                <a:pos x="connsiteX0" y="connsiteY0"/>
-              </a:cxn>
-              <a:cxn ang="0">
-                <a:pos x="connsiteX1" y="connsiteY1"/>
-              </a:cxn>
-              <a:cxn ang="0">
-                <a:pos x="connsiteX2" y="connsiteY2"/>
-              </a:cxn>
-              <a:cxn ang="0">
-                <a:pos x="connsiteX3" y="connsiteY3"/>
-              </a:cxn>
-              <a:cxn ang="0">
-                <a:pos x="connsiteX4" y="connsiteY4"/>
-              </a:cxn>
-            </a:cxnLst>
-            <a:rect l="l" t="t" r="r" b="b"/>
-            <a:pathLst>
-              <a:path w="220406" h="130596">
-                <a:moveTo>
-                  <a:pt x="85109" y="31775"/>
-                </a:moveTo>
-                <a:cubicBezTo>
-                  <a:pt x="102571" y="11931"/>
-                  <a:pt x="120034" y="-7912"/>
-                  <a:pt x="142259" y="3200"/>
-                </a:cubicBezTo>
-                <a:cubicBezTo>
-                  <a:pt x="164484" y="14312"/>
-                  <a:pt x="232746" y="77813"/>
-                  <a:pt x="218459" y="98450"/>
-                </a:cubicBezTo>
-                <a:cubicBezTo>
-                  <a:pt x="204172" y="119087"/>
-                  <a:pt x="91459" y="122263"/>
-                  <a:pt x="56534" y="127025"/>
-                </a:cubicBezTo>
-                <a:cubicBezTo>
-                  <a:pt x="21609" y="131788"/>
-                  <a:pt x="-18078" y="131787"/>
-                  <a:pt x="8909" y="127025"/>
-                </a:cubicBezTo>
-              </a:path>
-            </a:pathLst>
-          </a:custGeom>
-          <a:ln w="19050">
-            <a:solidFill>
-              <a:srgbClr val="0070C0"/>
-            </a:solidFill>
-            <a:prstDash val="sysDash"/>
-            <a:headEnd type="none" w="med" len="med"/>
-            <a:tailEnd type="arrow" w="med" len="med"/>
-          </a:ln>
-        </p:spPr>
-        <p:style>
-          <a:lnRef idx="1">
-            <a:schemeClr val="accent1"/>
-          </a:lnRef>
-          <a:fillRef idx="0">
-            <a:schemeClr val="accent1"/>
-          </a:fillRef>
-          <a:effectRef idx="0">
-            <a:schemeClr val="accent1"/>
-          </a:effectRef>
-          <a:fontRef idx="minor">
-            <a:schemeClr val="tx1"/>
-          </a:fontRef>
-        </p:style>
-        <p:txBody>
-          <a:bodyPr rtlCol="0" anchor="ctr"/>
-          <a:lstStyle/>
-          <a:p>
-            <a:pPr algn="ctr"/>
-            <a:endParaRPr lang="en-SG"/>
-          </a:p>
-        </p:txBody>
-      </p:sp>
-      <p:sp>
-        <p:nvSpPr>
-          <p:cNvPr id="74" name="TextBox 73">
-            <a:extLst>
-              <a:ext uri="{FF2B5EF4-FFF2-40B4-BE49-F238E27FC236}">
-                <a16:creationId xmlns:a16="http://schemas.microsoft.com/office/drawing/2014/main" id="{1D93ADC4-8422-4DC3-B7F7-D7412C0DD338}"/>
+                <a16:creationId xmlns:a16="http://schemas.microsoft.com/office/drawing/2014/main" id="{8B1D23B2-88C6-4D39-A0A3-4C3BA5CDD2B1}"/>
               </a:ext>
             </a:extLst>
           </p:cNvPr>
@@ -6643,8 +6238,8 @@
         </p:nvSpPr>
         <p:spPr>
           <a:xfrm>
-            <a:off x="6754079" y="5900659"/>
-            <a:ext cx="1722066" cy="138499"/>
+            <a:off x="2450524" y="1382907"/>
+            <a:ext cx="2121476" cy="184666"/>
           </a:xfrm>
           <a:prstGeom prst="rect">
             <a:avLst/>
@@ -6668,266 +6263,23 @@
             </a:lvl1pPr>
           </a:lstStyle>
           <a:p>
-            <a:pPr algn="l"/>
-            <a:r>
-              <a:rPr lang="en-US" sz="900" dirty="0"/>
-              <a:t> </a:t>
-            </a:r>
-            <a:r>
-              <a:rPr lang="en-US" sz="900" dirty="0" err="1"/>
-              <a:t>indicateUserLoggedIn</a:t>
-            </a:r>
-            <a:r>
-              <a:rPr lang="en-US" sz="900" dirty="0"/>
+            <a:r>
+              <a:rPr lang="en-US" sz="1200" dirty="0" err="1"/>
+              <a:t>LoginCommandParser</a:t>
+            </a:r>
+            <a:r>
+              <a:rPr lang="en-US" sz="1200" dirty="0"/>
               <a:t>()</a:t>
             </a:r>
           </a:p>
         </p:txBody>
       </p:sp>
-      <p:sp>
-        <p:nvSpPr>
-          <p:cNvPr id="96" name="Rectangle 62">
+      <p:cxnSp>
+        <p:nvCxnSpPr>
+          <p:cNvPr id="62" name="Straight Arrow Connector 61">
             <a:extLst>
               <a:ext uri="{FF2B5EF4-FFF2-40B4-BE49-F238E27FC236}">
-                <a16:creationId xmlns:a16="http://schemas.microsoft.com/office/drawing/2014/main" id="{4BE69BA8-9140-4461-A53D-9F66211028ED}"/>
-              </a:ext>
-            </a:extLst>
-          </p:cNvPr>
-          <p:cNvSpPr/>
-          <p:nvPr/>
-        </p:nvSpPr>
-        <p:spPr>
-          <a:xfrm>
-            <a:off x="9302704" y="6120780"/>
-            <a:ext cx="1526220" cy="490078"/>
-          </a:xfrm>
-          <a:prstGeom prst="rect">
-            <a:avLst/>
-          </a:prstGeom>
-          <a:solidFill>
-            <a:schemeClr val="accent3">
-              <a:lumMod val="60000"/>
-              <a:lumOff val="40000"/>
-            </a:schemeClr>
-          </a:solidFill>
-          <a:ln w="19050">
-            <a:solidFill>
-              <a:schemeClr val="accent3">
-                <a:lumMod val="60000"/>
-                <a:lumOff val="40000"/>
-              </a:schemeClr>
-            </a:solidFill>
-          </a:ln>
-          <a:effectLst/>
-        </p:spPr>
-        <p:style>
-          <a:lnRef idx="1">
-            <a:schemeClr val="accent2"/>
-          </a:lnRef>
-          <a:fillRef idx="2">
-            <a:schemeClr val="accent2"/>
-          </a:fillRef>
-          <a:effectRef idx="1">
-            <a:schemeClr val="accent2"/>
-          </a:effectRef>
-          <a:fontRef idx="minor">
-            <a:schemeClr val="dk1"/>
-          </a:fontRef>
-        </p:style>
-        <p:txBody>
-          <a:bodyPr rtlCol="0" anchor="ctr"/>
-          <a:lstStyle/>
-          <a:p>
-            <a:pPr algn="ctr"/>
-            <a:r>
-              <a:rPr lang="en-US" sz="1600" dirty="0">
-                <a:solidFill>
-                  <a:schemeClr val="bg1"/>
-                </a:solidFill>
-              </a:rPr>
-              <a:t>e:UserLoggedInEvent</a:t>
-            </a:r>
-            <a:endParaRPr lang="en-SG" sz="1600" dirty="0">
-              <a:solidFill>
-                <a:schemeClr val="bg1"/>
-              </a:solidFill>
-            </a:endParaRPr>
-          </a:p>
-        </p:txBody>
-      </p:sp>
-      <p:cxnSp>
-        <p:nvCxnSpPr>
-          <p:cNvPr id="97" name="Straight Connector 96">
-            <a:extLst>
-              <a:ext uri="{FF2B5EF4-FFF2-40B4-BE49-F238E27FC236}">
-                <a16:creationId xmlns:a16="http://schemas.microsoft.com/office/drawing/2014/main" id="{A53C96C7-958F-49D9-A787-A1F15D2EB73B}"/>
-              </a:ext>
-            </a:extLst>
-          </p:cNvPr>
-          <p:cNvCxnSpPr>
-            <a:cxnSpLocks/>
-            <a:endCxn id="109" idx="0"/>
-          </p:cNvCxnSpPr>
-          <p:nvPr/>
-        </p:nvCxnSpPr>
-        <p:spPr>
-          <a:xfrm>
-            <a:off x="10114945" y="6671088"/>
-            <a:ext cx="0" cy="771745"/>
-          </a:xfrm>
-          <a:prstGeom prst="line">
-            <a:avLst/>
-          </a:prstGeom>
-          <a:ln w="19050">
-            <a:solidFill>
-              <a:schemeClr val="accent3">
-                <a:lumMod val="60000"/>
-                <a:lumOff val="40000"/>
-              </a:schemeClr>
-            </a:solidFill>
-            <a:prstDash val="sysDash"/>
-          </a:ln>
-          <a:effectLst/>
-        </p:spPr>
-        <p:style>
-          <a:lnRef idx="1">
-            <a:schemeClr val="accent1"/>
-          </a:lnRef>
-          <a:fillRef idx="2">
-            <a:schemeClr val="accent1"/>
-          </a:fillRef>
-          <a:effectRef idx="1">
-            <a:schemeClr val="accent1"/>
-          </a:effectRef>
-          <a:fontRef idx="minor">
-            <a:schemeClr val="dk1"/>
-          </a:fontRef>
-        </p:style>
-      </p:cxnSp>
-      <p:sp>
-        <p:nvSpPr>
-          <p:cNvPr id="100" name="Rectangle 99">
-            <a:extLst>
-              <a:ext uri="{FF2B5EF4-FFF2-40B4-BE49-F238E27FC236}">
-                <a16:creationId xmlns:a16="http://schemas.microsoft.com/office/drawing/2014/main" id="{4E10C602-4DA3-43DB-B775-4F814BCCE345}"/>
-              </a:ext>
-            </a:extLst>
-          </p:cNvPr>
-          <p:cNvSpPr/>
-          <p:nvPr/>
-        </p:nvSpPr>
-        <p:spPr>
-          <a:xfrm>
-            <a:off x="10039407" y="6600101"/>
-            <a:ext cx="152400" cy="199803"/>
-          </a:xfrm>
-          <a:prstGeom prst="rect">
-            <a:avLst/>
-          </a:prstGeom>
-          <a:solidFill>
-            <a:schemeClr val="accent3">
-              <a:lumMod val="60000"/>
-              <a:lumOff val="40000"/>
-            </a:schemeClr>
-          </a:solidFill>
-          <a:ln>
-            <a:solidFill>
-              <a:schemeClr val="accent3">
-                <a:lumMod val="60000"/>
-                <a:lumOff val="40000"/>
-              </a:schemeClr>
-            </a:solidFill>
-          </a:ln>
-          <a:effectLst/>
-        </p:spPr>
-        <p:style>
-          <a:lnRef idx="1">
-            <a:schemeClr val="accent3"/>
-          </a:lnRef>
-          <a:fillRef idx="2">
-            <a:schemeClr val="accent3"/>
-          </a:fillRef>
-          <a:effectRef idx="1">
-            <a:schemeClr val="accent3"/>
-          </a:effectRef>
-          <a:fontRef idx="minor">
-            <a:schemeClr val="dk1"/>
-          </a:fontRef>
-        </p:style>
-        <p:txBody>
-          <a:bodyPr rtlCol="0" anchor="ctr"/>
-          <a:lstStyle/>
-          <a:p>
-            <a:pPr algn="ctr"/>
-            <a:endParaRPr lang="en-SG" sz="1400">
-              <a:solidFill>
-                <a:schemeClr val="accent3">
-                  <a:lumMod val="75000"/>
-                </a:schemeClr>
-              </a:solidFill>
-            </a:endParaRPr>
-          </a:p>
-        </p:txBody>
-      </p:sp>
-      <p:sp>
-        <p:nvSpPr>
-          <p:cNvPr id="67" name="Rectangle 66">
-            <a:extLst>
-              <a:ext uri="{FF2B5EF4-FFF2-40B4-BE49-F238E27FC236}">
-                <a16:creationId xmlns:a16="http://schemas.microsoft.com/office/drawing/2014/main" id="{287CE5FD-342D-4606-85AB-C4B7C4DA70A8}"/>
-              </a:ext>
-            </a:extLst>
-          </p:cNvPr>
-          <p:cNvSpPr/>
-          <p:nvPr/>
-        </p:nvSpPr>
-        <p:spPr>
-          <a:xfrm>
-            <a:off x="6395642" y="6024486"/>
-            <a:ext cx="169058" cy="1351034"/>
-          </a:xfrm>
-          <a:prstGeom prst="rect">
-            <a:avLst/>
-          </a:prstGeom>
-          <a:solidFill>
-            <a:srgbClr val="0070C0"/>
-          </a:solidFill>
-          <a:ln>
-            <a:solidFill>
-              <a:schemeClr val="tx1"/>
-            </a:solidFill>
-          </a:ln>
-          <a:effectLst/>
-        </p:spPr>
-        <p:style>
-          <a:lnRef idx="1">
-            <a:schemeClr val="accent3"/>
-          </a:lnRef>
-          <a:fillRef idx="2">
-            <a:schemeClr val="accent3"/>
-          </a:fillRef>
-          <a:effectRef idx="1">
-            <a:schemeClr val="accent3"/>
-          </a:effectRef>
-          <a:fontRef idx="minor">
-            <a:schemeClr val="dk1"/>
-          </a:fontRef>
-        </p:style>
-        <p:txBody>
-          <a:bodyPr rtlCol="0" anchor="ctr"/>
-          <a:lstStyle/>
-          <a:p>
-            <a:pPr algn="ctr"/>
-            <a:endParaRPr lang="en-SG" sz="1400"/>
-          </a:p>
-        </p:txBody>
-      </p:sp>
-      <p:cxnSp>
-        <p:nvCxnSpPr>
-          <p:cNvPr id="102" name="Straight Arrow Connector 101">
-            <a:extLst>
-              <a:ext uri="{FF2B5EF4-FFF2-40B4-BE49-F238E27FC236}">
-                <a16:creationId xmlns:a16="http://schemas.microsoft.com/office/drawing/2014/main" id="{06E53E39-5874-41EF-A8CD-18C8D6A13D58}"/>
+                <a16:creationId xmlns:a16="http://schemas.microsoft.com/office/drawing/2014/main" id="{F7362F59-303C-4B57-A15D-A88B3AEB66CC}"/>
               </a:ext>
             </a:extLst>
           </p:cNvPr>
@@ -6938,8 +6290,8 @@
         </p:nvCxnSpPr>
         <p:spPr>
           <a:xfrm>
-            <a:off x="6568818" y="6114872"/>
-            <a:ext cx="2733886" cy="0"/>
+            <a:off x="4879013" y="3672977"/>
+            <a:ext cx="1735614" cy="0"/>
           </a:xfrm>
           <a:prstGeom prst="straightConnector1">
             <a:avLst/>
@@ -6948,7 +6300,9 @@
             <a:solidFill>
               <a:srgbClr val="0070C0"/>
             </a:solidFill>
-            <a:tailEnd type="arrow"/>
+            <a:prstDash val="sysDash"/>
+            <a:headEnd type="arrow" w="med" len="med"/>
+            <a:tailEnd type="none" w="med" len="med"/>
           </a:ln>
         </p:spPr>
         <p:style>
@@ -6968,10 +6322,10 @@
       </p:cxnSp>
       <p:sp>
         <p:nvSpPr>
-          <p:cNvPr id="105" name="TextBox 104">
+          <p:cNvPr id="72" name="TextBox 71">
             <a:extLst>
               <a:ext uri="{FF2B5EF4-FFF2-40B4-BE49-F238E27FC236}">
-                <a16:creationId xmlns:a16="http://schemas.microsoft.com/office/drawing/2014/main" id="{42EF4379-E7A4-4E56-BB8A-C67A8DDE061B}"/>
+                <a16:creationId xmlns:a16="http://schemas.microsoft.com/office/drawing/2014/main" id="{2D0A8576-F987-480F-89A4-671024B2D5BF}"/>
               </a:ext>
             </a:extLst>
           </p:cNvPr>
@@ -6980,8 +6334,8 @@
         </p:nvSpPr>
         <p:spPr>
           <a:xfrm>
-            <a:off x="6161332" y="6146475"/>
-            <a:ext cx="2011237" cy="184666"/>
+            <a:off x="4944027" y="3442388"/>
+            <a:ext cx="1042552" cy="184666"/>
           </a:xfrm>
           <a:prstGeom prst="rect">
             <a:avLst/>
@@ -7006,83 +6360,18 @@
           </a:lstStyle>
           <a:p>
             <a:r>
-              <a:rPr lang="en-US" sz="1200" dirty="0" err="1">
-                <a:solidFill>
-                  <a:schemeClr val="accent3">
-                    <a:lumMod val="75000"/>
-                  </a:schemeClr>
-                </a:solidFill>
-              </a:rPr>
-              <a:t>UserLoggedInEvent</a:t>
-            </a:r>
-            <a:r>
-              <a:rPr lang="en-US" sz="1200" dirty="0">
-                <a:solidFill>
-                  <a:schemeClr val="accent3">
-                    <a:lumMod val="75000"/>
-                  </a:schemeClr>
-                </a:solidFill>
-              </a:rPr>
-              <a:t>()</a:t>
-            </a:r>
-          </a:p>
-        </p:txBody>
-      </p:sp>
-      <p:cxnSp>
-        <p:nvCxnSpPr>
-          <p:cNvPr id="106" name="Straight Arrow Connector 105">
+              <a:rPr lang="en-US" sz="1200" dirty="0"/>
+              <a:t>credentials</a:t>
+            </a:r>
+          </a:p>
+        </p:txBody>
+      </p:sp>
+      <p:sp>
+        <p:nvSpPr>
+          <p:cNvPr id="74" name="TextBox 73">
             <a:extLst>
               <a:ext uri="{FF2B5EF4-FFF2-40B4-BE49-F238E27FC236}">
-                <a16:creationId xmlns:a16="http://schemas.microsoft.com/office/drawing/2014/main" id="{4D60975F-FE3B-4BB5-B8E0-29146627293B}"/>
-              </a:ext>
-            </a:extLst>
-          </p:cNvPr>
-          <p:cNvCxnSpPr>
-            <a:cxnSpLocks/>
-          </p:cNvCxnSpPr>
-          <p:nvPr/>
-        </p:nvCxnSpPr>
-        <p:spPr>
-          <a:xfrm>
-            <a:off x="6577715" y="6790354"/>
-            <a:ext cx="3485157" cy="6389"/>
-          </a:xfrm>
-          <a:prstGeom prst="straightConnector1">
-            <a:avLst/>
-          </a:prstGeom>
-          <a:ln w="19050">
-            <a:solidFill>
-              <a:schemeClr val="accent3">
-                <a:lumMod val="60000"/>
-                <a:lumOff val="40000"/>
-              </a:schemeClr>
-            </a:solidFill>
-            <a:prstDash val="sysDash"/>
-            <a:headEnd type="arrow" w="med" len="med"/>
-            <a:tailEnd type="none" w="med" len="med"/>
-          </a:ln>
-        </p:spPr>
-        <p:style>
-          <a:lnRef idx="1">
-            <a:schemeClr val="accent1"/>
-          </a:lnRef>
-          <a:fillRef idx="0">
-            <a:schemeClr val="accent1"/>
-          </a:fillRef>
-          <a:effectRef idx="0">
-            <a:schemeClr val="accent1"/>
-          </a:effectRef>
-          <a:fontRef idx="minor">
-            <a:schemeClr val="tx1"/>
-          </a:fontRef>
-        </p:style>
-      </p:cxnSp>
-      <p:sp>
-        <p:nvSpPr>
-          <p:cNvPr id="108" name="TextBox 107">
-            <a:extLst>
-              <a:ext uri="{FF2B5EF4-FFF2-40B4-BE49-F238E27FC236}">
-                <a16:creationId xmlns:a16="http://schemas.microsoft.com/office/drawing/2014/main" id="{179A5168-8616-46D6-A94A-8DF7246321A9}"/>
+                <a16:creationId xmlns:a16="http://schemas.microsoft.com/office/drawing/2014/main" id="{8C3478B4-42F4-4054-A057-07B99EFAF74F}"/>
               </a:ext>
             </a:extLst>
           </p:cNvPr>
@@ -7091,8 +6380,8 @@
         </p:nvSpPr>
         <p:spPr>
           <a:xfrm>
-            <a:off x="6697383" y="6602527"/>
-            <a:ext cx="2011237" cy="184666"/>
+            <a:off x="5166036" y="2375657"/>
+            <a:ext cx="1722066" cy="276999"/>
           </a:xfrm>
           <a:prstGeom prst="rect">
             <a:avLst/>
@@ -7116,67 +6405,30 @@
             </a:lvl1pPr>
           </a:lstStyle>
           <a:p>
-            <a:r>
-              <a:rPr lang="en-US" sz="1200" dirty="0">
-                <a:solidFill>
-                  <a:schemeClr val="accent3">
-                    <a:lumMod val="75000"/>
-                  </a:schemeClr>
-                </a:solidFill>
-              </a:rPr>
-              <a:t>e</a:t>
-            </a:r>
-          </a:p>
-        </p:txBody>
-      </p:sp>
-      <p:sp>
-        <p:nvSpPr>
-          <p:cNvPr id="109" name="TextBox 108">
-            <a:extLst>
-              <a:ext uri="{FF2B5EF4-FFF2-40B4-BE49-F238E27FC236}">
-                <a16:creationId xmlns:a16="http://schemas.microsoft.com/office/drawing/2014/main" id="{C063C862-5340-4C08-8ACE-366CF1DA156C}"/>
-              </a:ext>
-            </a:extLst>
-          </p:cNvPr>
-          <p:cNvSpPr txBox="1"/>
-          <p:nvPr/>
-        </p:nvSpPr>
-        <p:spPr>
-          <a:xfrm>
-            <a:off x="10057795" y="7442833"/>
-            <a:ext cx="114300" cy="184666"/>
-          </a:xfrm>
-          <a:prstGeom prst="rect">
-            <a:avLst/>
-          </a:prstGeom>
-          <a:noFill/>
-        </p:spPr>
-        <p:txBody>
-          <a:bodyPr wrap="square" lIns="0" tIns="0" rIns="0" bIns="0" rtlCol="0">
-            <a:spAutoFit/>
-          </a:bodyPr>
-          <a:lstStyle>
-            <a:defPPr>
-              <a:defRPr lang="en-US"/>
-            </a:defPPr>
-            <a:lvl1pPr algn="r">
-              <a:defRPr sz="1400">
-                <a:solidFill>
-                  <a:srgbClr val="0070C0"/>
-                </a:solidFill>
-              </a:defRPr>
-            </a:lvl1pPr>
-          </a:lstStyle>
-          <a:p>
-            <a:r>
-              <a:rPr lang="en-US" sz="1200" dirty="0">
-                <a:solidFill>
-                  <a:schemeClr val="accent3">
-                    <a:lumMod val="75000"/>
-                  </a:schemeClr>
-                </a:solidFill>
-              </a:rPr>
-              <a:t>X</a:t>
+            <a:pPr algn="l"/>
+            <a:r>
+              <a:rPr lang="en-US" sz="900" dirty="0"/>
+              <a:t> </a:t>
+            </a:r>
+            <a:r>
+              <a:rPr lang="en-US" sz="900" dirty="0" err="1"/>
+              <a:t>LoginCredentials</a:t>
+            </a:r>
+            <a:endParaRPr lang="en-US" sz="900" dirty="0"/>
+          </a:p>
+          <a:p>
+            <a:pPr algn="l"/>
+            <a:r>
+              <a:rPr lang="en-US" sz="900" dirty="0"/>
+              <a:t>(username, </a:t>
+            </a:r>
+            <a:r>
+              <a:rPr lang="en-US" sz="900" dirty="0" err="1"/>
+              <a:t>plainPassword</a:t>
+            </a:r>
+            <a:r>
+              <a:rPr lang="en-US" sz="900" dirty="0"/>
+              <a:t>)</a:t>
             </a:r>
           </a:p>
         </p:txBody>

</xml_diff>